<commit_message>
Minor changes to lesson 3. Added lesson 4.
</commit_message>
<xml_diff>
--- a/Lesson3/AdvancedRoboticsLesson3.pptx
+++ b/Lesson3/AdvancedRoboticsLesson3.pptx
@@ -5,19 +5,16 @@
     <p:sldMasterId id="2147483648" r:id="rId1"/>
   </p:sldMasterIdLst>
   <p:notesMasterIdLst>
-    <p:notesMasterId r:id="rId12"/>
+    <p:notesMasterId r:id="rId9"/>
   </p:notesMasterIdLst>
   <p:sldIdLst>
     <p:sldId id="266" r:id="rId2"/>
     <p:sldId id="274" r:id="rId3"/>
     <p:sldId id="270" r:id="rId4"/>
-    <p:sldId id="272" r:id="rId5"/>
-    <p:sldId id="273" r:id="rId6"/>
-    <p:sldId id="271" r:id="rId7"/>
-    <p:sldId id="275" r:id="rId8"/>
-    <p:sldId id="276" r:id="rId9"/>
-    <p:sldId id="277" r:id="rId10"/>
-    <p:sldId id="278" r:id="rId11"/>
+    <p:sldId id="271" r:id="rId5"/>
+    <p:sldId id="275" r:id="rId6"/>
+    <p:sldId id="277" r:id="rId7"/>
+    <p:sldId id="278" r:id="rId8"/>
   </p:sldIdLst>
   <p:sldSz cx="12192000" cy="6858000"/>
   <p:notesSz cx="6858000" cy="9144000"/>
@@ -206,7 +203,7 @@
           <a:p>
             <a:fld id="{88DFE0DC-517A-40C1-B3B1-8C641051689B}" type="datetimeFigureOut">
               <a:rPr lang="en-US" smtClean="0"/>
-              <a:t>11/16/2020</a:t>
+              <a:t>11/18/2020</a:t>
             </a:fld>
             <a:endParaRPr lang="en-US"/>
           </a:p>
@@ -893,7 +890,7 @@
             <a:fld id="{5923F103-BC34-4FE4-A40E-EDDEECFDA5D0}" type="datetimeFigureOut">
               <a:rPr lang="en-US" dirty="0"/>
               <a:pPr/>
-              <a:t>11/16/2020</a:t>
+              <a:t>11/18/2020</a:t>
             </a:fld>
             <a:endParaRPr lang="en-US" dirty="0"/>
           </a:p>
@@ -1977,7 +1974,7 @@
           <a:p>
             <a:fld id="{923A1CC3-2375-41D4-9E03-427CAF2A4C1A}" type="datetimeFigureOut">
               <a:rPr lang="en-US" dirty="0"/>
-              <a:t>11/16/2020</a:t>
+              <a:t>11/18/2020</a:t>
             </a:fld>
             <a:endParaRPr lang="en-US" dirty="0"/>
           </a:p>
@@ -2953,7 +2950,7 @@
           <a:p>
             <a:fld id="{AFF16868-8199-4C2C-A5B1-63AEE139F88E}" type="datetimeFigureOut">
               <a:rPr lang="en-US" dirty="0"/>
-              <a:t>11/16/2020</a:t>
+              <a:t>11/18/2020</a:t>
             </a:fld>
             <a:endParaRPr lang="en-US" dirty="0"/>
           </a:p>
@@ -4083,7 +4080,7 @@
           <a:p>
             <a:fld id="{AAD9FF7F-6988-44CC-821B-644E70CD2F73}" type="datetimeFigureOut">
               <a:rPr lang="en-US" dirty="0"/>
-              <a:t>11/16/2020</a:t>
+              <a:t>11/18/2020</a:t>
             </a:fld>
             <a:endParaRPr lang="en-US" dirty="0"/>
           </a:p>
@@ -5112,7 +5109,7 @@
           <a:p>
             <a:fld id="{5C12C299-16B2-4475-990D-751901EACC14}" type="datetimeFigureOut">
               <a:rPr lang="en-US" dirty="0"/>
-              <a:t>11/16/2020</a:t>
+              <a:t>11/18/2020</a:t>
             </a:fld>
             <a:endParaRPr lang="en-US" dirty="0"/>
           </a:p>
@@ -5768,7 +5765,7 @@
           <a:p>
             <a:fld id="{9FE86839-B9D8-4651-8783-F325ECE74E65}" type="datetimeFigureOut">
               <a:rPr lang="en-US" dirty="0"/>
-              <a:t>11/16/2020</a:t>
+              <a:t>11/18/2020</a:t>
             </a:fld>
             <a:endParaRPr lang="en-US" dirty="0"/>
           </a:p>
@@ -6625,7 +6622,7 @@
           <a:p>
             <a:fld id="{FD484F64-32F6-45C5-931F-ADC1662401D0}" type="datetimeFigureOut">
               <a:rPr lang="en-US" dirty="0"/>
-              <a:t>11/16/2020</a:t>
+              <a:t>11/18/2020</a:t>
             </a:fld>
             <a:endParaRPr lang="en-US" dirty="0"/>
           </a:p>
@@ -6811,7 +6808,7 @@
           <a:p>
             <a:fld id="{53086D93-FCAC-47E0-A2EE-787E62CA814C}" type="datetimeFigureOut">
               <a:rPr lang="en-US" dirty="0"/>
-              <a:t>11/16/2020</a:t>
+              <a:t>11/18/2020</a:t>
             </a:fld>
             <a:endParaRPr lang="en-US" dirty="0"/>
           </a:p>
@@ -7779,7 +7776,7 @@
           <a:p>
             <a:fld id="{CDA879A6-0FD0-4734-A311-86BFCA472E6E}" type="datetimeFigureOut">
               <a:rPr lang="en-US" dirty="0"/>
-              <a:t>11/16/2020</a:t>
+              <a:t>11/18/2020</a:t>
             </a:fld>
             <a:endParaRPr lang="en-US" dirty="0"/>
           </a:p>
@@ -7986,7 +7983,7 @@
           <a:p>
             <a:fld id="{19C9CA7B-DFD4-44B5-8C60-D14B8CD1FB59}" type="datetimeFigureOut">
               <a:rPr lang="en-US" dirty="0"/>
-              <a:t>11/16/2020</a:t>
+              <a:t>11/18/2020</a:t>
             </a:fld>
             <a:endParaRPr lang="en-US" dirty="0"/>
           </a:p>
@@ -9016,7 +9013,7 @@
           <a:p>
             <a:fld id="{F34E6425-0181-43F2-84FC-787E803FD2F8}" type="datetimeFigureOut">
               <a:rPr lang="en-US" dirty="0"/>
-              <a:t>11/16/2020</a:t>
+              <a:t>11/18/2020</a:t>
             </a:fld>
             <a:endParaRPr lang="en-US" dirty="0"/>
           </a:p>
@@ -9284,7 +9281,7 @@
           <a:p>
             <a:fld id="{3BDB8791-F1B0-41E7-B7FD-A781E65C4266}" type="datetimeFigureOut">
               <a:rPr lang="en-US" dirty="0"/>
-              <a:t>11/16/2020</a:t>
+              <a:t>11/18/2020</a:t>
             </a:fld>
             <a:endParaRPr lang="en-US" dirty="0"/>
           </a:p>
@@ -9690,7 +9687,7 @@
           <a:p>
             <a:fld id="{5FDD63B2-E120-4ED8-B27B-C685F510A5FE}" type="datetimeFigureOut">
               <a:rPr lang="en-US" dirty="0"/>
-              <a:t>11/16/2020</a:t>
+              <a:t>11/18/2020</a:t>
             </a:fld>
             <a:endParaRPr lang="en-US" dirty="0"/>
           </a:p>
@@ -9813,7 +9810,7 @@
           <a:p>
             <a:fld id="{7AA18ACC-A947-437B-A130-35BD54FDF1E9}" type="datetimeFigureOut">
               <a:rPr lang="en-US" dirty="0"/>
-              <a:t>11/16/2020</a:t>
+              <a:t>11/18/2020</a:t>
             </a:fld>
             <a:endParaRPr lang="en-US" dirty="0"/>
           </a:p>
@@ -9904,7 +9901,7 @@
           <a:p>
             <a:fld id="{7C8D7E02-BCB8-4D50-A234-369438C08659}" type="datetimeFigureOut">
               <a:rPr lang="en-US" dirty="0"/>
-              <a:t>11/16/2020</a:t>
+              <a:t>11/18/2020</a:t>
             </a:fld>
             <a:endParaRPr lang="en-US" dirty="0"/>
           </a:p>
@@ -10981,7 +10978,7 @@
           <a:p>
             <a:fld id="{76E86A4C-8E40-4F87-A4F0-01A0687C5742}" type="datetimeFigureOut">
               <a:rPr lang="en-US" dirty="0"/>
-              <a:t>11/16/2020</a:t>
+              <a:t>11/18/2020</a:t>
             </a:fld>
             <a:endParaRPr lang="en-US" dirty="0"/>
           </a:p>
@@ -12085,7 +12082,7 @@
           <a:p>
             <a:fld id="{35E72C73-2D91-4E12-BA25-F0AA0C03599B}" type="datetimeFigureOut">
               <a:rPr lang="en-US" dirty="0"/>
-              <a:t>11/16/2020</a:t>
+              <a:t>11/18/2020</a:t>
             </a:fld>
             <a:endParaRPr lang="en-US" dirty="0"/>
           </a:p>
@@ -13078,7 +13075,7 @@
           <a:p>
             <a:fld id="{2BE451C3-0FF4-47C4-B829-773ADF60F88C}" type="datetimeFigureOut">
               <a:rPr lang="en-US" dirty="0"/>
-              <a:t>11/16/2020</a:t>
+              <a:t>11/18/2020</a:t>
             </a:fld>
             <a:endParaRPr lang="en-US" dirty="0"/>
           </a:p>
@@ -13734,107 +13731,6 @@
 </p:sld>
 </file>
 
-<file path=ppt/slides/slide10.xml><?xml version="1.0" encoding="utf-8"?>
-<p:sld xmlns:a="http://schemas.openxmlformats.org/drawingml/2006/main" xmlns:r="http://schemas.openxmlformats.org/officeDocument/2006/relationships" xmlns:p="http://schemas.openxmlformats.org/presentationml/2006/main">
-  <p:cSld>
-    <p:spTree>
-      <p:nvGrpSpPr>
-        <p:cNvPr id="1" name=""/>
-        <p:cNvGrpSpPr/>
-        <p:nvPr/>
-      </p:nvGrpSpPr>
-      <p:grpSpPr>
-        <a:xfrm>
-          <a:off x="0" y="0"/>
-          <a:ext cx="0" cy="0"/>
-          <a:chOff x="0" y="0"/>
-          <a:chExt cx="0" cy="0"/>
-        </a:xfrm>
-      </p:grpSpPr>
-      <p:sp>
-        <p:nvSpPr>
-          <p:cNvPr id="2" name="Title 1">
-            <a:extLst>
-              <a:ext uri="{FF2B5EF4-FFF2-40B4-BE49-F238E27FC236}">
-                <a16:creationId xmlns:a16="http://schemas.microsoft.com/office/drawing/2014/main" id="{081F7B1B-5F4F-4154-A164-4A58B7B544DD}"/>
-              </a:ext>
-            </a:extLst>
-          </p:cNvPr>
-          <p:cNvSpPr>
-            <a:spLocks noGrp="1"/>
-          </p:cNvSpPr>
-          <p:nvPr>
-            <p:ph type="title"/>
-          </p:nvPr>
-        </p:nvSpPr>
-        <p:spPr/>
-        <p:txBody>
-          <a:bodyPr/>
-          <a:lstStyle/>
-          <a:p>
-            <a:r>
-              <a:rPr lang="en-US" dirty="0"/>
-              <a:t>Student Exercise</a:t>
-            </a:r>
-          </a:p>
-        </p:txBody>
-      </p:sp>
-      <p:sp>
-        <p:nvSpPr>
-          <p:cNvPr id="3" name="Content Placeholder 2">
-            <a:extLst>
-              <a:ext uri="{FF2B5EF4-FFF2-40B4-BE49-F238E27FC236}">
-                <a16:creationId xmlns:a16="http://schemas.microsoft.com/office/drawing/2014/main" id="{3DD27597-39DB-46F0-8A71-C231A3C41D88}"/>
-              </a:ext>
-            </a:extLst>
-          </p:cNvPr>
-          <p:cNvSpPr>
-            <a:spLocks noGrp="1"/>
-          </p:cNvSpPr>
-          <p:nvPr>
-            <p:ph idx="1"/>
-          </p:nvPr>
-        </p:nvSpPr>
-        <p:spPr/>
-        <p:txBody>
-          <a:bodyPr/>
-          <a:lstStyle/>
-          <a:p>
-            <a:r>
-              <a:rPr lang="en-US" dirty="0"/>
-              <a:t>Create and control a </a:t>
-            </a:r>
-            <a:r>
-              <a:rPr lang="en-US" dirty="0" err="1"/>
-              <a:t>mecanum</a:t>
-            </a:r>
-            <a:r>
-              <a:rPr lang="en-US" dirty="0"/>
-              <a:t> drive base with analog joysticks.</a:t>
-            </a:r>
-          </a:p>
-          <a:p>
-            <a:pPr lvl="1"/>
-            <a:r>
-              <a:rPr lang="en-US" dirty="0"/>
-              <a:t>…</a:t>
-            </a:r>
-          </a:p>
-        </p:txBody>
-      </p:sp>
-    </p:spTree>
-    <p:extLst>
-      <p:ext uri="{BB962C8B-B14F-4D97-AF65-F5344CB8AC3E}">
-        <p14:creationId xmlns:p14="http://schemas.microsoft.com/office/powerpoint/2010/main" val="2182139524"/>
-      </p:ext>
-    </p:extLst>
-  </p:cSld>
-  <p:clrMapOvr>
-    <a:masterClrMapping/>
-  </p:clrMapOvr>
-</p:sld>
-</file>
-
 <file path=ppt/slides/slide2.xml><?xml version="1.0" encoding="utf-8"?>
 <p:sld xmlns:a="http://schemas.openxmlformats.org/drawingml/2006/main" xmlns:r="http://schemas.openxmlformats.org/officeDocument/2006/relationships" xmlns:p="http://schemas.openxmlformats.org/presentationml/2006/main">
   <p:cSld>
@@ -13924,20 +13820,6 @@
             <a:pPr lvl="1"/>
             <a:r>
               <a:rPr lang="en-US" dirty="0"/>
-              <a:t>Simple Servo</a:t>
-            </a:r>
-          </a:p>
-          <a:p>
-            <a:pPr lvl="1"/>
-            <a:r>
-              <a:rPr lang="en-US" dirty="0"/>
-              <a:t>Enhanced Servo</a:t>
-            </a:r>
-          </a:p>
-          <a:p>
-            <a:pPr lvl="1"/>
-            <a:r>
-              <a:rPr lang="en-US" dirty="0"/>
               <a:t>Game Controller and Button Panel</a:t>
             </a:r>
           </a:p>
@@ -13946,13 +13828,6 @@
             <a:r>
               <a:rPr lang="en-US" dirty="0"/>
               <a:t>Control a motor using analog joystick</a:t>
-            </a:r>
-          </a:p>
-          <a:p>
-            <a:pPr lvl="1"/>
-            <a:r>
-              <a:rPr lang="en-US" dirty="0"/>
-              <a:t>Control a servo using game controller button</a:t>
             </a:r>
           </a:p>
           <a:p>
@@ -14056,13 +13931,19 @@
         <p:spPr/>
         <p:txBody>
           <a:bodyPr>
-            <a:normAutofit fontScale="85000" lnSpcReduction="20000"/>
+            <a:normAutofit fontScale="77500" lnSpcReduction="20000"/>
           </a:bodyPr>
           <a:lstStyle/>
           <a:p>
             <a:r>
               <a:rPr lang="en-US" dirty="0"/>
-              <a:t>Create an instance of a motor controller object (e.g. </a:t>
+              <a:t>Create an instance of a motor controller object.</a:t>
+            </a:r>
+          </a:p>
+          <a:p>
+            <a:r>
+              <a:rPr lang="en-US" dirty="0"/>
+              <a:t>Example: </a:t>
             </a:r>
             <a:r>
               <a:rPr lang="en-US" dirty="0" err="1"/>
@@ -14070,7 +13951,7 @@
             </a:r>
             <a:r>
               <a:rPr lang="en-US" dirty="0"/>
-              <a:t>).</a:t>
+              <a:t> – Constructor needs instance name and CAN ID.</a:t>
             </a:r>
           </a:p>
           <a:p>
@@ -14179,269 +14060,6 @@
           <p:cNvPr id="2" name="Title 1">
             <a:extLst>
               <a:ext uri="{FF2B5EF4-FFF2-40B4-BE49-F238E27FC236}">
-                <a16:creationId xmlns:a16="http://schemas.microsoft.com/office/drawing/2014/main" id="{100E513D-B165-473A-BE13-43945A8A530C}"/>
-              </a:ext>
-            </a:extLst>
-          </p:cNvPr>
-          <p:cNvSpPr>
-            <a:spLocks noGrp="1"/>
-          </p:cNvSpPr>
-          <p:nvPr>
-            <p:ph type="title"/>
-          </p:nvPr>
-        </p:nvSpPr>
-        <p:spPr/>
-        <p:txBody>
-          <a:bodyPr/>
-          <a:lstStyle/>
-          <a:p>
-            <a:r>
-              <a:rPr lang="en-US" dirty="0"/>
-              <a:t>Simple Servo</a:t>
-            </a:r>
-          </a:p>
-        </p:txBody>
-      </p:sp>
-      <p:sp>
-        <p:nvSpPr>
-          <p:cNvPr id="3" name="Content Placeholder 2">
-            <a:extLst>
-              <a:ext uri="{FF2B5EF4-FFF2-40B4-BE49-F238E27FC236}">
-                <a16:creationId xmlns:a16="http://schemas.microsoft.com/office/drawing/2014/main" id="{F829DF0B-01DE-4B94-8CA2-89890BF91088}"/>
-              </a:ext>
-            </a:extLst>
-          </p:cNvPr>
-          <p:cNvSpPr>
-            <a:spLocks noGrp="1"/>
-          </p:cNvSpPr>
-          <p:nvPr>
-            <p:ph idx="1"/>
-          </p:nvPr>
-        </p:nvSpPr>
-        <p:spPr/>
-        <p:txBody>
-          <a:bodyPr/>
-          <a:lstStyle/>
-          <a:p>
-            <a:r>
-              <a:rPr lang="en-US" dirty="0"/>
-              <a:t>Create an instance of a servo object (</a:t>
-            </a:r>
-            <a:r>
-              <a:rPr lang="en-US" dirty="0" err="1"/>
-              <a:t>TrcServo</a:t>
-            </a:r>
-            <a:r>
-              <a:rPr lang="en-US" dirty="0"/>
-              <a:t>).</a:t>
-            </a:r>
-          </a:p>
-          <a:p>
-            <a:r>
-              <a:rPr lang="en-US" dirty="0"/>
-              <a:t> Servo object properties:</a:t>
-            </a:r>
-          </a:p>
-          <a:p>
-            <a:pPr lvl="1"/>
-            <a:r>
-              <a:rPr lang="en-US" dirty="0"/>
-              <a:t>Servo direction.</a:t>
-            </a:r>
-          </a:p>
-          <a:p>
-            <a:pPr lvl="1"/>
-            <a:r>
-              <a:rPr lang="en-US" dirty="0"/>
-              <a:t>Servo position.</a:t>
-            </a:r>
-          </a:p>
-          <a:p>
-            <a:pPr lvl="1"/>
-            <a:r>
-              <a:rPr lang="en-US" dirty="0"/>
-              <a:t>Logical position vs Physical position.</a:t>
-            </a:r>
-          </a:p>
-        </p:txBody>
-      </p:sp>
-    </p:spTree>
-    <p:extLst>
-      <p:ext uri="{BB962C8B-B14F-4D97-AF65-F5344CB8AC3E}">
-        <p14:creationId xmlns:p14="http://schemas.microsoft.com/office/powerpoint/2010/main" val="1505887376"/>
-      </p:ext>
-    </p:extLst>
-  </p:cSld>
-  <p:clrMapOvr>
-    <a:masterClrMapping/>
-  </p:clrMapOvr>
-</p:sld>
-</file>
-
-<file path=ppt/slides/slide5.xml><?xml version="1.0" encoding="utf-8"?>
-<p:sld xmlns:a="http://schemas.openxmlformats.org/drawingml/2006/main" xmlns:r="http://schemas.openxmlformats.org/officeDocument/2006/relationships" xmlns:p="http://schemas.openxmlformats.org/presentationml/2006/main">
-  <p:cSld>
-    <p:spTree>
-      <p:nvGrpSpPr>
-        <p:cNvPr id="1" name=""/>
-        <p:cNvGrpSpPr/>
-        <p:nvPr/>
-      </p:nvGrpSpPr>
-      <p:grpSpPr>
-        <a:xfrm>
-          <a:off x="0" y="0"/>
-          <a:ext cx="0" cy="0"/>
-          <a:chOff x="0" y="0"/>
-          <a:chExt cx="0" cy="0"/>
-        </a:xfrm>
-      </p:grpSpPr>
-      <p:sp>
-        <p:nvSpPr>
-          <p:cNvPr id="2" name="Title 1">
-            <a:extLst>
-              <a:ext uri="{FF2B5EF4-FFF2-40B4-BE49-F238E27FC236}">
-                <a16:creationId xmlns:a16="http://schemas.microsoft.com/office/drawing/2014/main" id="{525893B9-344E-48A3-9A68-0A605A95634A}"/>
-              </a:ext>
-            </a:extLst>
-          </p:cNvPr>
-          <p:cNvSpPr>
-            <a:spLocks noGrp="1"/>
-          </p:cNvSpPr>
-          <p:nvPr>
-            <p:ph type="title"/>
-          </p:nvPr>
-        </p:nvSpPr>
-        <p:spPr/>
-        <p:txBody>
-          <a:bodyPr/>
-          <a:lstStyle/>
-          <a:p>
-            <a:r>
-              <a:rPr lang="en-US" dirty="0"/>
-              <a:t>Enhanced Servo</a:t>
-            </a:r>
-          </a:p>
-        </p:txBody>
-      </p:sp>
-      <p:sp>
-        <p:nvSpPr>
-          <p:cNvPr id="3" name="Content Placeholder 2">
-            <a:extLst>
-              <a:ext uri="{FF2B5EF4-FFF2-40B4-BE49-F238E27FC236}">
-                <a16:creationId xmlns:a16="http://schemas.microsoft.com/office/drawing/2014/main" id="{600D47D3-09E7-4EFE-99BC-3A72AFB5BF74}"/>
-              </a:ext>
-            </a:extLst>
-          </p:cNvPr>
-          <p:cNvSpPr>
-            <a:spLocks noGrp="1"/>
-          </p:cNvSpPr>
-          <p:nvPr>
-            <p:ph idx="1"/>
-          </p:nvPr>
-        </p:nvSpPr>
-        <p:spPr/>
-        <p:txBody>
-          <a:bodyPr/>
-          <a:lstStyle/>
-          <a:p>
-            <a:r>
-              <a:rPr lang="en-US" dirty="0"/>
-              <a:t>Create an instance of an enhanced servo object (</a:t>
-            </a:r>
-            <a:r>
-              <a:rPr lang="en-US" dirty="0" err="1"/>
-              <a:t>TrcEnhancedServo</a:t>
-            </a:r>
-            <a:r>
-              <a:rPr lang="en-US" dirty="0"/>
-              <a:t>).</a:t>
-            </a:r>
-          </a:p>
-          <a:p>
-            <a:r>
-              <a:rPr lang="en-US" dirty="0"/>
-              <a:t>Enhanced servo object properties:</a:t>
-            </a:r>
-          </a:p>
-          <a:p>
-            <a:pPr lvl="1"/>
-            <a:r>
-              <a:rPr lang="en-US" dirty="0"/>
-              <a:t>Dual servo support.</a:t>
-            </a:r>
-          </a:p>
-          <a:p>
-            <a:pPr lvl="1"/>
-            <a:r>
-              <a:rPr lang="en-US" dirty="0"/>
-              <a:t>Regular servo vs continuous servo.</a:t>
-            </a:r>
-          </a:p>
-          <a:p>
-            <a:pPr lvl="1"/>
-            <a:r>
-              <a:rPr lang="en-US" dirty="0"/>
-              <a:t>Limit switches support.</a:t>
-            </a:r>
-          </a:p>
-          <a:p>
-            <a:pPr lvl="1"/>
-            <a:r>
-              <a:rPr lang="en-US" dirty="0"/>
-              <a:t>Encoder support.</a:t>
-            </a:r>
-          </a:p>
-          <a:p>
-            <a:pPr lvl="1"/>
-            <a:r>
-              <a:rPr lang="en-US" dirty="0"/>
-              <a:t>Range calibration.</a:t>
-            </a:r>
-          </a:p>
-          <a:p>
-            <a:pPr lvl="1"/>
-            <a:r>
-              <a:rPr lang="en-US" dirty="0"/>
-              <a:t>Speed control and step mode.</a:t>
-            </a:r>
-          </a:p>
-        </p:txBody>
-      </p:sp>
-    </p:spTree>
-    <p:extLst>
-      <p:ext uri="{BB962C8B-B14F-4D97-AF65-F5344CB8AC3E}">
-        <p14:creationId xmlns:p14="http://schemas.microsoft.com/office/powerpoint/2010/main" val="3569371887"/>
-      </p:ext>
-    </p:extLst>
-  </p:cSld>
-  <p:clrMapOvr>
-    <a:masterClrMapping/>
-  </p:clrMapOvr>
-</p:sld>
-</file>
-
-<file path=ppt/slides/slide6.xml><?xml version="1.0" encoding="utf-8"?>
-<p:sld xmlns:a="http://schemas.openxmlformats.org/drawingml/2006/main" xmlns:r="http://schemas.openxmlformats.org/officeDocument/2006/relationships" xmlns:p="http://schemas.openxmlformats.org/presentationml/2006/main">
-  <p:cSld>
-    <p:spTree>
-      <p:nvGrpSpPr>
-        <p:cNvPr id="1" name=""/>
-        <p:cNvGrpSpPr/>
-        <p:nvPr/>
-      </p:nvGrpSpPr>
-      <p:grpSpPr>
-        <a:xfrm>
-          <a:off x="0" y="0"/>
-          <a:ext cx="0" cy="0"/>
-          <a:chOff x="0" y="0"/>
-          <a:chExt cx="0" cy="0"/>
-        </a:xfrm>
-      </p:grpSpPr>
-      <p:sp>
-        <p:nvSpPr>
-          <p:cNvPr id="2" name="Title 1">
-            <a:extLst>
-              <a:ext uri="{FF2B5EF4-FFF2-40B4-BE49-F238E27FC236}">
                 <a16:creationId xmlns:a16="http://schemas.microsoft.com/office/drawing/2014/main" id="{FF0985BA-68DE-406F-A9A0-6DB403D43A09}"/>
               </a:ext>
             </a:extLst>
@@ -14484,7 +14102,7 @@
         <p:spPr/>
         <p:txBody>
           <a:bodyPr>
-            <a:normAutofit fontScale="85000" lnSpcReduction="20000"/>
+            <a:normAutofit fontScale="77500" lnSpcReduction="20000"/>
           </a:bodyPr>
           <a:lstStyle/>
           <a:p>
@@ -14496,6 +14114,28 @@
           <a:p>
             <a:r>
               <a:rPr lang="en-US" dirty="0"/>
+              <a:t>Example: </a:t>
+            </a:r>
+            <a:r>
+              <a:rPr lang="en-US" dirty="0" err="1"/>
+              <a:t>FrcJoystick</a:t>
+            </a:r>
+            <a:r>
+              <a:rPr lang="en-US" dirty="0"/>
+              <a:t>, </a:t>
+            </a:r>
+            <a:r>
+              <a:rPr lang="en-US" dirty="0" err="1"/>
+              <a:t>FrcXboxController</a:t>
+            </a:r>
+            <a:r>
+              <a:rPr lang="en-US" dirty="0"/>
+              <a:t> – Constructor needs instance name and port number.</a:t>
+            </a:r>
+          </a:p>
+          <a:p>
+            <a:r>
+              <a:rPr lang="en-US" dirty="0"/>
               <a:t>Typical game controller consists of:</a:t>
             </a:r>
           </a:p>
@@ -14510,13 +14150,8 @@
             <a:pPr lvl="1"/>
             <a:r>
               <a:rPr lang="en-US" dirty="0"/>
-              <a:t>A number of analog throttles</a:t>
-            </a:r>
-            <a:r>
-              <a:rPr lang="en-US"/>
-              <a:t>/twists.</a:t>
-            </a:r>
-            <a:endParaRPr lang="en-US" dirty="0"/>
+              <a:t>A number of analog throttles/twists.</a:t>
+            </a:r>
           </a:p>
           <a:p>
             <a:pPr lvl="1"/>
@@ -14588,7 +14223,7 @@
 </p:sld>
 </file>
 
-<file path=ppt/slides/slide7.xml><?xml version="1.0" encoding="utf-8"?>
+<file path=ppt/slides/slide5.xml><?xml version="1.0" encoding="utf-8"?>
 <p:sld xmlns:a="http://schemas.openxmlformats.org/drawingml/2006/main" xmlns:r="http://schemas.openxmlformats.org/officeDocument/2006/relationships" xmlns:p="http://schemas.openxmlformats.org/presentationml/2006/main">
   <p:cSld>
     <p:spTree>
@@ -14706,116 +14341,7 @@
 </p:sld>
 </file>
 
-<file path=ppt/slides/slide8.xml><?xml version="1.0" encoding="utf-8"?>
-<p:sld xmlns:a="http://schemas.openxmlformats.org/drawingml/2006/main" xmlns:r="http://schemas.openxmlformats.org/officeDocument/2006/relationships" xmlns:p="http://schemas.openxmlformats.org/presentationml/2006/main">
-  <p:cSld>
-    <p:spTree>
-      <p:nvGrpSpPr>
-        <p:cNvPr id="1" name=""/>
-        <p:cNvGrpSpPr/>
-        <p:nvPr/>
-      </p:nvGrpSpPr>
-      <p:grpSpPr>
-        <a:xfrm>
-          <a:off x="0" y="0"/>
-          <a:ext cx="0" cy="0"/>
-          <a:chOff x="0" y="0"/>
-          <a:chExt cx="0" cy="0"/>
-        </a:xfrm>
-      </p:grpSpPr>
-      <p:sp>
-        <p:nvSpPr>
-          <p:cNvPr id="2" name="Title 1">
-            <a:extLst>
-              <a:ext uri="{FF2B5EF4-FFF2-40B4-BE49-F238E27FC236}">
-                <a16:creationId xmlns:a16="http://schemas.microsoft.com/office/drawing/2014/main" id="{540E304D-D990-4EE0-97F8-1ED1750741AF}"/>
-              </a:ext>
-            </a:extLst>
-          </p:cNvPr>
-          <p:cNvSpPr>
-            <a:spLocks noGrp="1"/>
-          </p:cNvSpPr>
-          <p:nvPr>
-            <p:ph type="title"/>
-          </p:nvPr>
-        </p:nvSpPr>
-        <p:spPr>
-          <a:xfrm>
-            <a:off x="528506" y="838200"/>
-            <a:ext cx="10242958" cy="955800"/>
-          </a:xfrm>
-        </p:spPr>
-        <p:txBody>
-          <a:bodyPr/>
-          <a:lstStyle/>
-          <a:p>
-            <a:r>
-              <a:rPr lang="en-US" dirty="0"/>
-              <a:t>Control a Servo with Game Controller Buttons </a:t>
-            </a:r>
-          </a:p>
-        </p:txBody>
-      </p:sp>
-      <p:sp>
-        <p:nvSpPr>
-          <p:cNvPr id="3" name="Content Placeholder 2">
-            <a:extLst>
-              <a:ext uri="{FF2B5EF4-FFF2-40B4-BE49-F238E27FC236}">
-                <a16:creationId xmlns:a16="http://schemas.microsoft.com/office/drawing/2014/main" id="{62BB9F6E-124C-414A-B348-DB9D4F40C5F2}"/>
-              </a:ext>
-            </a:extLst>
-          </p:cNvPr>
-          <p:cNvSpPr>
-            <a:spLocks noGrp="1"/>
-          </p:cNvSpPr>
-          <p:nvPr>
-            <p:ph idx="1"/>
-          </p:nvPr>
-        </p:nvSpPr>
-        <p:spPr/>
-        <p:txBody>
-          <a:bodyPr/>
-          <a:lstStyle/>
-          <a:p>
-            <a:r>
-              <a:rPr lang="en-US" dirty="0"/>
-              <a:t>Create and configure a game controller.</a:t>
-            </a:r>
-          </a:p>
-          <a:p>
-            <a:r>
-              <a:rPr lang="en-US" dirty="0"/>
-              <a:t>Create and configure a servo.</a:t>
-            </a:r>
-          </a:p>
-          <a:p>
-            <a:r>
-              <a:rPr lang="en-US" dirty="0"/>
-              <a:t>Create a button event handler and hook it up to the game controller object.</a:t>
-            </a:r>
-          </a:p>
-          <a:p>
-            <a:r>
-              <a:rPr lang="en-US" dirty="0"/>
-              <a:t>Add code to the button event handler to set servo positions responding to button events.</a:t>
-            </a:r>
-          </a:p>
-        </p:txBody>
-      </p:sp>
-    </p:spTree>
-    <p:extLst>
-      <p:ext uri="{BB962C8B-B14F-4D97-AF65-F5344CB8AC3E}">
-        <p14:creationId xmlns:p14="http://schemas.microsoft.com/office/powerpoint/2010/main" val="1125487302"/>
-      </p:ext>
-    </p:extLst>
-  </p:cSld>
-  <p:clrMapOvr>
-    <a:masterClrMapping/>
-  </p:clrMapOvr>
-</p:sld>
-</file>
-
-<file path=ppt/slides/slide9.xml><?xml version="1.0" encoding="utf-8"?>
+<file path=ppt/slides/slide6.xml><?xml version="1.0" encoding="utf-8"?>
 <p:sld xmlns:a="http://schemas.openxmlformats.org/drawingml/2006/main" xmlns:r="http://schemas.openxmlformats.org/officeDocument/2006/relationships" xmlns:p="http://schemas.openxmlformats.org/presentationml/2006/main">
   <p:cSld>
     <p:spTree>
@@ -14850,8 +14376,8 @@
         </p:nvSpPr>
         <p:spPr>
           <a:xfrm>
-            <a:off x="830510" y="838200"/>
-            <a:ext cx="9295002" cy="706964"/>
+            <a:off x="1040234" y="838200"/>
+            <a:ext cx="9370503" cy="706964"/>
           </a:xfrm>
         </p:spPr>
         <p:txBody>
@@ -14860,7 +14386,7 @@
           <a:p>
             <a:r>
               <a:rPr lang="en-US" dirty="0"/>
-              <a:t>Control a Simple Drive Base with Analog Joysticks</a:t>
+              <a:t>Exercise: Simple Drive Base</a:t>
             </a:r>
           </a:p>
         </p:txBody>
@@ -14883,51 +14409,69 @@
         </p:nvSpPr>
         <p:spPr/>
         <p:txBody>
-          <a:bodyPr/>
+          <a:bodyPr>
+            <a:normAutofit/>
+          </a:bodyPr>
           <a:lstStyle/>
           <a:p>
             <a:r>
               <a:rPr lang="en-US" dirty="0"/>
-              <a:t>Create left and right wheel motors.</a:t>
-            </a:r>
-          </a:p>
-          <a:p>
+              <a:t>Control a simple drive base with analog joysticks.</a:t>
+            </a:r>
+          </a:p>
+          <a:p>
+            <a:pPr lvl="1"/>
             <a:r>
               <a:rPr lang="en-US" dirty="0"/>
-              <a:t>Configure wheel motors.</a:t>
-            </a:r>
-          </a:p>
-          <a:p>
+              <a:t>Create and configure game controller(s).</a:t>
+            </a:r>
+          </a:p>
+          <a:p>
+            <a:pPr lvl="1"/>
             <a:r>
               <a:rPr lang="en-US" dirty="0"/>
-              <a:t>Enable motor odometry.</a:t>
-            </a:r>
-          </a:p>
-          <a:p>
+              <a:t>Create and configure 2 motors.</a:t>
+            </a:r>
+          </a:p>
+          <a:p>
+            <a:pPr lvl="1"/>
             <a:r>
               <a:rPr lang="en-US" dirty="0"/>
-              <a:t>Create a Simple Drive Base with the wheel motors.</a:t>
-            </a:r>
-          </a:p>
-          <a:p>
+              <a:t>Create and configure a simple drive base with the 2 motors.</a:t>
+            </a:r>
+          </a:p>
+          <a:p>
+            <a:pPr lvl="1"/>
             <a:r>
               <a:rPr lang="en-US" dirty="0"/>
-              <a:t>Configure drive base.</a:t>
-            </a:r>
-          </a:p>
-          <a:p>
+              <a:t>Add </a:t>
+            </a:r>
+            <a:r>
+              <a:rPr lang="en-US" dirty="0" err="1"/>
+              <a:t>TeleOp</a:t>
+            </a:r>
             <a:r>
               <a:rPr lang="en-US" dirty="0"/>
-              <a:t>Enable drive base odometry.</a:t>
-            </a:r>
-          </a:p>
-          <a:p>
+              <a:t> code to run the simple drive base with the joysticks using tank drive.</a:t>
+            </a:r>
+          </a:p>
+          <a:p>
+            <a:pPr lvl="1"/>
             <a:r>
               <a:rPr lang="en-US" dirty="0"/>
-              <a:t>Add code to read joystick values and set drive base power with it.</a:t>
-            </a:r>
-          </a:p>
-          <a:p>
+              <a:t>Enable motor and drive base </a:t>
+            </a:r>
+            <a:r>
+              <a:rPr lang="en-US" dirty="0" err="1"/>
+              <a:t>odometries</a:t>
+            </a:r>
+            <a:r>
+              <a:rPr lang="en-US" dirty="0"/>
+              <a:t>.</a:t>
+            </a:r>
+          </a:p>
+          <a:p>
+            <a:pPr lvl="1"/>
             <a:r>
               <a:rPr lang="en-US" dirty="0"/>
               <a:t>Add code to display drive base odometry.</a:t>
@@ -14939,6 +14483,187 @@
     <p:extLst>
       <p:ext uri="{BB962C8B-B14F-4D97-AF65-F5344CB8AC3E}">
         <p14:creationId xmlns:p14="http://schemas.microsoft.com/office/powerpoint/2010/main" val="621596750"/>
+      </p:ext>
+    </p:extLst>
+  </p:cSld>
+  <p:clrMapOvr>
+    <a:masterClrMapping/>
+  </p:clrMapOvr>
+</p:sld>
+</file>
+
+<file path=ppt/slides/slide7.xml><?xml version="1.0" encoding="utf-8"?>
+<p:sld xmlns:a="http://schemas.openxmlformats.org/drawingml/2006/main" xmlns:r="http://schemas.openxmlformats.org/officeDocument/2006/relationships" xmlns:p="http://schemas.openxmlformats.org/presentationml/2006/main">
+  <p:cSld>
+    <p:spTree>
+      <p:nvGrpSpPr>
+        <p:cNvPr id="1" name=""/>
+        <p:cNvGrpSpPr/>
+        <p:nvPr/>
+      </p:nvGrpSpPr>
+      <p:grpSpPr>
+        <a:xfrm>
+          <a:off x="0" y="0"/>
+          <a:ext cx="0" cy="0"/>
+          <a:chOff x="0" y="0"/>
+          <a:chExt cx="0" cy="0"/>
+        </a:xfrm>
+      </p:grpSpPr>
+      <p:sp>
+        <p:nvSpPr>
+          <p:cNvPr id="2" name="Title 1">
+            <a:extLst>
+              <a:ext uri="{FF2B5EF4-FFF2-40B4-BE49-F238E27FC236}">
+                <a16:creationId xmlns:a16="http://schemas.microsoft.com/office/drawing/2014/main" id="{081F7B1B-5F4F-4154-A164-4A58B7B544DD}"/>
+              </a:ext>
+            </a:extLst>
+          </p:cNvPr>
+          <p:cNvSpPr>
+            <a:spLocks noGrp="1"/>
+          </p:cNvSpPr>
+          <p:nvPr>
+            <p:ph type="title"/>
+          </p:nvPr>
+        </p:nvSpPr>
+        <p:spPr>
+          <a:xfrm>
+            <a:off x="1154953" y="973668"/>
+            <a:ext cx="9851403" cy="706964"/>
+          </a:xfrm>
+        </p:spPr>
+        <p:txBody>
+          <a:bodyPr/>
+          <a:lstStyle/>
+          <a:p>
+            <a:r>
+              <a:rPr lang="en-US" dirty="0"/>
+              <a:t>Exercise: </a:t>
+            </a:r>
+            <a:r>
+              <a:rPr lang="en-US" dirty="0" err="1"/>
+              <a:t>Mecanum</a:t>
+            </a:r>
+            <a:r>
+              <a:rPr lang="en-US" dirty="0"/>
+              <a:t> Drive Base</a:t>
+            </a:r>
+          </a:p>
+        </p:txBody>
+      </p:sp>
+      <p:sp>
+        <p:nvSpPr>
+          <p:cNvPr id="3" name="Content Placeholder 2">
+            <a:extLst>
+              <a:ext uri="{FF2B5EF4-FFF2-40B4-BE49-F238E27FC236}">
+                <a16:creationId xmlns:a16="http://schemas.microsoft.com/office/drawing/2014/main" id="{3DD27597-39DB-46F0-8A71-C231A3C41D88}"/>
+              </a:ext>
+            </a:extLst>
+          </p:cNvPr>
+          <p:cNvSpPr>
+            <a:spLocks noGrp="1"/>
+          </p:cNvSpPr>
+          <p:nvPr>
+            <p:ph idx="1"/>
+          </p:nvPr>
+        </p:nvSpPr>
+        <p:spPr/>
+        <p:txBody>
+          <a:bodyPr/>
+          <a:lstStyle/>
+          <a:p>
+            <a:r>
+              <a:rPr lang="en-US" dirty="0"/>
+              <a:t>Control a </a:t>
+            </a:r>
+            <a:r>
+              <a:rPr lang="en-US" dirty="0" err="1"/>
+              <a:t>mecanum</a:t>
+            </a:r>
+            <a:r>
+              <a:rPr lang="en-US" dirty="0"/>
+              <a:t> drive base with analog joysticks.</a:t>
+            </a:r>
+          </a:p>
+          <a:p>
+            <a:pPr lvl="1"/>
+            <a:r>
+              <a:rPr lang="en-US" dirty="0"/>
+              <a:t>Create and configure game controller(s).</a:t>
+            </a:r>
+          </a:p>
+          <a:p>
+            <a:pPr lvl="1"/>
+            <a:r>
+              <a:rPr lang="en-US" dirty="0"/>
+              <a:t>Create and configure 4 motors.</a:t>
+            </a:r>
+          </a:p>
+          <a:p>
+            <a:pPr lvl="1"/>
+            <a:r>
+              <a:rPr lang="en-US" dirty="0"/>
+              <a:t>Create and configure a </a:t>
+            </a:r>
+            <a:r>
+              <a:rPr lang="en-US" dirty="0" err="1"/>
+              <a:t>mecanum</a:t>
+            </a:r>
+            <a:r>
+              <a:rPr lang="en-US" dirty="0"/>
+              <a:t> drive base with the 4 motors.</a:t>
+            </a:r>
+          </a:p>
+          <a:p>
+            <a:pPr lvl="1"/>
+            <a:r>
+              <a:rPr lang="en-US" dirty="0"/>
+              <a:t>Add </a:t>
+            </a:r>
+            <a:r>
+              <a:rPr lang="en-US" dirty="0" err="1"/>
+              <a:t>TeleOp</a:t>
+            </a:r>
+            <a:r>
+              <a:rPr lang="en-US" dirty="0"/>
+              <a:t> code to run the </a:t>
+            </a:r>
+            <a:r>
+              <a:rPr lang="en-US" dirty="0" err="1"/>
+              <a:t>mecanum</a:t>
+            </a:r>
+            <a:r>
+              <a:rPr lang="en-US" dirty="0"/>
+              <a:t> drive base with the joysticks.</a:t>
+            </a:r>
+          </a:p>
+          <a:p>
+            <a:pPr lvl="1"/>
+            <a:r>
+              <a:rPr lang="en-US" dirty="0"/>
+              <a:t>Enable motor and drive base </a:t>
+            </a:r>
+            <a:r>
+              <a:rPr lang="en-US" dirty="0" err="1"/>
+              <a:t>odometries</a:t>
+            </a:r>
+            <a:r>
+              <a:rPr lang="en-US" dirty="0"/>
+              <a:t>.</a:t>
+            </a:r>
+          </a:p>
+          <a:p>
+            <a:pPr lvl="1"/>
+            <a:r>
+              <a:rPr lang="en-US" dirty="0"/>
+              <a:t>Add code to display drive base odometry.</a:t>
+            </a:r>
+          </a:p>
+        </p:txBody>
+      </p:sp>
+    </p:spTree>
+    <p:extLst>
+      <p:ext uri="{BB962C8B-B14F-4D97-AF65-F5344CB8AC3E}">
+        <p14:creationId xmlns:p14="http://schemas.microsoft.com/office/powerpoint/2010/main" val="2182139524"/>
       </p:ext>
     </p:extLst>
   </p:cSld>

</xml_diff>

<commit_message>
Added Lesson 4. Added some pictures.
</commit_message>
<xml_diff>
--- a/Lesson3/AdvancedRoboticsLesson3.pptx
+++ b/Lesson3/AdvancedRoboticsLesson3.pptx
@@ -121,6 +121,3479 @@
 </p:presentation>
 </file>
 
+<file path=ppt/charts/chart1.xml><?xml version="1.0" encoding="utf-8"?>
+<c:chartSpace xmlns:c="http://schemas.openxmlformats.org/drawingml/2006/chart" xmlns:a="http://schemas.openxmlformats.org/drawingml/2006/main" xmlns:r="http://schemas.openxmlformats.org/officeDocument/2006/relationships" xmlns:c16r2="http://schemas.microsoft.com/office/drawing/2015/06/chart">
+  <c:date1904 val="0"/>
+  <c:lang val="en-US"/>
+  <c:roundedCorners val="0"/>
+  <mc:AlternateContent xmlns:mc="http://schemas.openxmlformats.org/markup-compatibility/2006">
+    <mc:Choice xmlns:c14="http://schemas.microsoft.com/office/drawing/2007/8/2/chart" Requires="c14">
+      <c14:style val="102"/>
+    </mc:Choice>
+    <mc:Fallback>
+      <c:style val="2"/>
+    </mc:Fallback>
+  </mc:AlternateContent>
+  <c:chart>
+    <c:title>
+      <c:tx>
+        <c:rich>
+          <a:bodyPr rot="0" spcFirstLastPara="1" vertOverflow="ellipsis" vert="horz" wrap="square" anchor="ctr" anchorCtr="1"/>
+          <a:lstStyle/>
+          <a:p>
+            <a:pPr>
+              <a:defRPr sz="1400" b="0" i="0" u="none" strike="noStrike" kern="1200" spc="0" baseline="0">
+                <a:solidFill>
+                  <a:schemeClr val="tx1">
+                    <a:lumMod val="65000"/>
+                    <a:lumOff val="35000"/>
+                  </a:schemeClr>
+                </a:solidFill>
+                <a:latin typeface="+mn-lt"/>
+                <a:ea typeface="+mn-ea"/>
+                <a:cs typeface="+mn-cs"/>
+              </a:defRPr>
+            </a:pPr>
+            <a:r>
+              <a:rPr lang="en-US"/>
+              <a:t>Power Output vs Joystick Input</a:t>
+            </a:r>
+          </a:p>
+        </c:rich>
+      </c:tx>
+      <c:overlay val="0"/>
+      <c:spPr>
+        <a:noFill/>
+        <a:ln>
+          <a:noFill/>
+        </a:ln>
+        <a:effectLst/>
+      </c:spPr>
+      <c:txPr>
+        <a:bodyPr rot="0" spcFirstLastPara="1" vertOverflow="ellipsis" vert="horz" wrap="square" anchor="ctr" anchorCtr="1"/>
+        <a:lstStyle/>
+        <a:p>
+          <a:pPr>
+            <a:defRPr sz="1400" b="0" i="0" u="none" strike="noStrike" kern="1200" spc="0" baseline="0">
+              <a:solidFill>
+                <a:schemeClr val="tx1">
+                  <a:lumMod val="65000"/>
+                  <a:lumOff val="35000"/>
+                </a:schemeClr>
+              </a:solidFill>
+              <a:latin typeface="+mn-lt"/>
+              <a:ea typeface="+mn-ea"/>
+              <a:cs typeface="+mn-cs"/>
+            </a:defRPr>
+          </a:pPr>
+          <a:endParaRPr lang="en-US"/>
+        </a:p>
+      </c:txPr>
+    </c:title>
+    <c:autoTitleDeleted val="0"/>
+    <c:plotArea>
+      <c:layout/>
+      <c:scatterChart>
+        <c:scatterStyle val="lineMarker"/>
+        <c:varyColors val="0"/>
+        <c:ser>
+          <c:idx val="0"/>
+          <c:order val="0"/>
+          <c:tx>
+            <c:strRef>
+              <c:f>Sheet1!$B$2</c:f>
+              <c:strCache>
+                <c:ptCount val="1"/>
+                <c:pt idx="0">
+                  <c:v>Power Output</c:v>
+                </c:pt>
+              </c:strCache>
+            </c:strRef>
+          </c:tx>
+          <c:spPr>
+            <a:ln w="19050" cap="rnd">
+              <a:solidFill>
+                <a:schemeClr val="accent1"/>
+              </a:solidFill>
+              <a:round/>
+            </a:ln>
+            <a:effectLst/>
+          </c:spPr>
+          <c:marker>
+            <c:symbol val="none"/>
+          </c:marker>
+          <c:xVal>
+            <c:numRef>
+              <c:f>Sheet1!$A$3:$A$203</c:f>
+              <c:numCache>
+                <c:formatCode>General</c:formatCode>
+                <c:ptCount val="201"/>
+                <c:pt idx="0">
+                  <c:v>-1</c:v>
+                </c:pt>
+                <c:pt idx="1">
+                  <c:v>-0.99</c:v>
+                </c:pt>
+                <c:pt idx="2">
+                  <c:v>-0.98</c:v>
+                </c:pt>
+                <c:pt idx="3">
+                  <c:v>-0.97</c:v>
+                </c:pt>
+                <c:pt idx="4">
+                  <c:v>-0.96</c:v>
+                </c:pt>
+                <c:pt idx="5">
+                  <c:v>-0.95</c:v>
+                </c:pt>
+                <c:pt idx="6">
+                  <c:v>-0.94</c:v>
+                </c:pt>
+                <c:pt idx="7">
+                  <c:v>-0.93</c:v>
+                </c:pt>
+                <c:pt idx="8">
+                  <c:v>-0.92</c:v>
+                </c:pt>
+                <c:pt idx="9">
+                  <c:v>-0.91</c:v>
+                </c:pt>
+                <c:pt idx="10">
+                  <c:v>-0.9</c:v>
+                </c:pt>
+                <c:pt idx="11">
+                  <c:v>-0.89</c:v>
+                </c:pt>
+                <c:pt idx="12">
+                  <c:v>-0.88</c:v>
+                </c:pt>
+                <c:pt idx="13">
+                  <c:v>-0.87</c:v>
+                </c:pt>
+                <c:pt idx="14">
+                  <c:v>-0.86</c:v>
+                </c:pt>
+                <c:pt idx="15">
+                  <c:v>-0.85</c:v>
+                </c:pt>
+                <c:pt idx="16">
+                  <c:v>-0.84</c:v>
+                </c:pt>
+                <c:pt idx="17">
+                  <c:v>-0.83</c:v>
+                </c:pt>
+                <c:pt idx="18">
+                  <c:v>-0.82</c:v>
+                </c:pt>
+                <c:pt idx="19">
+                  <c:v>-0.81</c:v>
+                </c:pt>
+                <c:pt idx="20">
+                  <c:v>-0.8</c:v>
+                </c:pt>
+                <c:pt idx="21">
+                  <c:v>-0.79</c:v>
+                </c:pt>
+                <c:pt idx="22">
+                  <c:v>-0.78</c:v>
+                </c:pt>
+                <c:pt idx="23">
+                  <c:v>-0.77</c:v>
+                </c:pt>
+                <c:pt idx="24">
+                  <c:v>-0.76</c:v>
+                </c:pt>
+                <c:pt idx="25">
+                  <c:v>-0.75</c:v>
+                </c:pt>
+                <c:pt idx="26">
+                  <c:v>-0.74</c:v>
+                </c:pt>
+                <c:pt idx="27">
+                  <c:v>-0.73</c:v>
+                </c:pt>
+                <c:pt idx="28">
+                  <c:v>-0.72</c:v>
+                </c:pt>
+                <c:pt idx="29">
+                  <c:v>-0.71</c:v>
+                </c:pt>
+                <c:pt idx="30">
+                  <c:v>-0.7</c:v>
+                </c:pt>
+                <c:pt idx="31">
+                  <c:v>-0.69</c:v>
+                </c:pt>
+                <c:pt idx="32">
+                  <c:v>-0.68</c:v>
+                </c:pt>
+                <c:pt idx="33">
+                  <c:v>-0.67</c:v>
+                </c:pt>
+                <c:pt idx="34">
+                  <c:v>-0.66</c:v>
+                </c:pt>
+                <c:pt idx="35">
+                  <c:v>-0.65</c:v>
+                </c:pt>
+                <c:pt idx="36">
+                  <c:v>-0.64</c:v>
+                </c:pt>
+                <c:pt idx="37">
+                  <c:v>-0.63</c:v>
+                </c:pt>
+                <c:pt idx="38">
+                  <c:v>-0.62</c:v>
+                </c:pt>
+                <c:pt idx="39">
+                  <c:v>-0.61</c:v>
+                </c:pt>
+                <c:pt idx="40">
+                  <c:v>-0.6</c:v>
+                </c:pt>
+                <c:pt idx="41">
+                  <c:v>-0.59</c:v>
+                </c:pt>
+                <c:pt idx="42">
+                  <c:v>-0.57999999999999996</c:v>
+                </c:pt>
+                <c:pt idx="43">
+                  <c:v>-0.56999999999999995</c:v>
+                </c:pt>
+                <c:pt idx="44">
+                  <c:v>-0.56000000000000005</c:v>
+                </c:pt>
+                <c:pt idx="45">
+                  <c:v>-0.55000000000000004</c:v>
+                </c:pt>
+                <c:pt idx="46">
+                  <c:v>-0.54</c:v>
+                </c:pt>
+                <c:pt idx="47">
+                  <c:v>-0.53</c:v>
+                </c:pt>
+                <c:pt idx="48">
+                  <c:v>-0.52</c:v>
+                </c:pt>
+                <c:pt idx="49">
+                  <c:v>-0.51</c:v>
+                </c:pt>
+                <c:pt idx="50">
+                  <c:v>-0.5</c:v>
+                </c:pt>
+                <c:pt idx="51">
+                  <c:v>-0.49</c:v>
+                </c:pt>
+                <c:pt idx="52">
+                  <c:v>-0.48</c:v>
+                </c:pt>
+                <c:pt idx="53">
+                  <c:v>-0.47</c:v>
+                </c:pt>
+                <c:pt idx="54">
+                  <c:v>-0.46</c:v>
+                </c:pt>
+                <c:pt idx="55">
+                  <c:v>-0.45</c:v>
+                </c:pt>
+                <c:pt idx="56">
+                  <c:v>-0.44</c:v>
+                </c:pt>
+                <c:pt idx="57">
+                  <c:v>-0.42999999999999899</c:v>
+                </c:pt>
+                <c:pt idx="58">
+                  <c:v>-0.41999999999999899</c:v>
+                </c:pt>
+                <c:pt idx="59">
+                  <c:v>-0.40999999999999898</c:v>
+                </c:pt>
+                <c:pt idx="60">
+                  <c:v>-0.39999999999999902</c:v>
+                </c:pt>
+                <c:pt idx="61">
+                  <c:v>-0.38999999999999901</c:v>
+                </c:pt>
+                <c:pt idx="62">
+                  <c:v>-0.37999999999999901</c:v>
+                </c:pt>
+                <c:pt idx="63">
+                  <c:v>-0.369999999999999</c:v>
+                </c:pt>
+                <c:pt idx="64">
+                  <c:v>-0.35999999999999899</c:v>
+                </c:pt>
+                <c:pt idx="65">
+                  <c:v>-0.34999999999999898</c:v>
+                </c:pt>
+                <c:pt idx="66">
+                  <c:v>-0.33999999999999903</c:v>
+                </c:pt>
+                <c:pt idx="67">
+                  <c:v>-0.32999999999999902</c:v>
+                </c:pt>
+                <c:pt idx="68">
+                  <c:v>-0.31999999999999901</c:v>
+                </c:pt>
+                <c:pt idx="69">
+                  <c:v>-0.309999999999999</c:v>
+                </c:pt>
+                <c:pt idx="70">
+                  <c:v>-0.29999999999999899</c:v>
+                </c:pt>
+                <c:pt idx="71">
+                  <c:v>-0.28999999999999898</c:v>
+                </c:pt>
+                <c:pt idx="72">
+                  <c:v>-0.27999999999999903</c:v>
+                </c:pt>
+                <c:pt idx="73">
+                  <c:v>-0.26999999999999902</c:v>
+                </c:pt>
+                <c:pt idx="74">
+                  <c:v>-0.25999999999999901</c:v>
+                </c:pt>
+                <c:pt idx="75">
+                  <c:v>-0.249999999999999</c:v>
+                </c:pt>
+                <c:pt idx="76">
+                  <c:v>-0.23999999999999899</c:v>
+                </c:pt>
+                <c:pt idx="77">
+                  <c:v>-0.22999999999999901</c:v>
+                </c:pt>
+                <c:pt idx="78">
+                  <c:v>-0.219999999999999</c:v>
+                </c:pt>
+                <c:pt idx="79">
+                  <c:v>-0.20999999999999899</c:v>
+                </c:pt>
+                <c:pt idx="80">
+                  <c:v>-0.19999999999999901</c:v>
+                </c:pt>
+                <c:pt idx="81">
+                  <c:v>-0.189999999999999</c:v>
+                </c:pt>
+                <c:pt idx="82">
+                  <c:v>-0.17999999999999899</c:v>
+                </c:pt>
+                <c:pt idx="83">
+                  <c:v>-0.16999999999999901</c:v>
+                </c:pt>
+                <c:pt idx="84">
+                  <c:v>-0.159999999999999</c:v>
+                </c:pt>
+                <c:pt idx="85">
+                  <c:v>-0.149999999999999</c:v>
+                </c:pt>
+                <c:pt idx="86">
+                  <c:v>-0.13999999999999899</c:v>
+                </c:pt>
+                <c:pt idx="87">
+                  <c:v>-0.12999999999999901</c:v>
+                </c:pt>
+                <c:pt idx="88">
+                  <c:v>-0.119999999999999</c:v>
+                </c:pt>
+                <c:pt idx="89">
+                  <c:v>-0.109999999999999</c:v>
+                </c:pt>
+                <c:pt idx="90">
+                  <c:v>-9.9999999999999006E-2</c:v>
+                </c:pt>
+                <c:pt idx="91">
+                  <c:v>-8.9999999999998997E-2</c:v>
+                </c:pt>
+                <c:pt idx="92">
+                  <c:v>-7.9999999999999002E-2</c:v>
+                </c:pt>
+                <c:pt idx="93">
+                  <c:v>-6.9999999999998994E-2</c:v>
+                </c:pt>
+                <c:pt idx="94">
+                  <c:v>-5.9999999999999103E-2</c:v>
+                </c:pt>
+                <c:pt idx="95">
+                  <c:v>-4.9999999999998997E-2</c:v>
+                </c:pt>
+                <c:pt idx="96">
+                  <c:v>-3.9999999999999002E-2</c:v>
+                </c:pt>
+                <c:pt idx="97">
+                  <c:v>-2.9999999999999E-2</c:v>
+                </c:pt>
+                <c:pt idx="98">
+                  <c:v>-1.9999999999999001E-2</c:v>
+                </c:pt>
+                <c:pt idx="99">
+                  <c:v>-9.9999999999990097E-3</c:v>
+                </c:pt>
+                <c:pt idx="100">
+                  <c:v>0</c:v>
+                </c:pt>
+                <c:pt idx="101">
+                  <c:v>0.01</c:v>
+                </c:pt>
+                <c:pt idx="102">
+                  <c:v>0.02</c:v>
+                </c:pt>
+                <c:pt idx="103">
+                  <c:v>0.03</c:v>
+                </c:pt>
+                <c:pt idx="104">
+                  <c:v>0.04</c:v>
+                </c:pt>
+                <c:pt idx="105">
+                  <c:v>0.05</c:v>
+                </c:pt>
+                <c:pt idx="106">
+                  <c:v>6.0000000000000102E-2</c:v>
+                </c:pt>
+                <c:pt idx="107">
+                  <c:v>7.0000000000000104E-2</c:v>
+                </c:pt>
+                <c:pt idx="108">
+                  <c:v>8.0000000000000099E-2</c:v>
+                </c:pt>
+                <c:pt idx="109">
+                  <c:v>9.0000000000000094E-2</c:v>
+                </c:pt>
+                <c:pt idx="110">
+                  <c:v>0.1</c:v>
+                </c:pt>
+                <c:pt idx="111">
+                  <c:v>0.11</c:v>
+                </c:pt>
+                <c:pt idx="112">
+                  <c:v>0.12</c:v>
+                </c:pt>
+                <c:pt idx="113">
+                  <c:v>0.13</c:v>
+                </c:pt>
+                <c:pt idx="114">
+                  <c:v>0.14000000000000001</c:v>
+                </c:pt>
+                <c:pt idx="115">
+                  <c:v>0.15</c:v>
+                </c:pt>
+                <c:pt idx="116">
+                  <c:v>0.16</c:v>
+                </c:pt>
+                <c:pt idx="117">
+                  <c:v>0.17</c:v>
+                </c:pt>
+                <c:pt idx="118">
+                  <c:v>0.18</c:v>
+                </c:pt>
+                <c:pt idx="119">
+                  <c:v>0.19</c:v>
+                </c:pt>
+                <c:pt idx="120">
+                  <c:v>0.2</c:v>
+                </c:pt>
+                <c:pt idx="121">
+                  <c:v>0.21</c:v>
+                </c:pt>
+                <c:pt idx="122">
+                  <c:v>0.22</c:v>
+                </c:pt>
+                <c:pt idx="123">
+                  <c:v>0.23</c:v>
+                </c:pt>
+                <c:pt idx="124">
+                  <c:v>0.24</c:v>
+                </c:pt>
+                <c:pt idx="125">
+                  <c:v>0.25</c:v>
+                </c:pt>
+                <c:pt idx="126">
+                  <c:v>0.26</c:v>
+                </c:pt>
+                <c:pt idx="127">
+                  <c:v>0.27</c:v>
+                </c:pt>
+                <c:pt idx="128">
+                  <c:v>0.28000000000000003</c:v>
+                </c:pt>
+                <c:pt idx="129">
+                  <c:v>0.28999999999999998</c:v>
+                </c:pt>
+                <c:pt idx="130">
+                  <c:v>0.3</c:v>
+                </c:pt>
+                <c:pt idx="131">
+                  <c:v>0.31</c:v>
+                </c:pt>
+                <c:pt idx="132">
+                  <c:v>0.32</c:v>
+                </c:pt>
+                <c:pt idx="133">
+                  <c:v>0.33</c:v>
+                </c:pt>
+                <c:pt idx="134">
+                  <c:v>0.34</c:v>
+                </c:pt>
+                <c:pt idx="135">
+                  <c:v>0.35</c:v>
+                </c:pt>
+                <c:pt idx="136">
+                  <c:v>0.36</c:v>
+                </c:pt>
+                <c:pt idx="137">
+                  <c:v>0.37</c:v>
+                </c:pt>
+                <c:pt idx="138">
+                  <c:v>0.38</c:v>
+                </c:pt>
+                <c:pt idx="139">
+                  <c:v>0.39</c:v>
+                </c:pt>
+                <c:pt idx="140">
+                  <c:v>0.4</c:v>
+                </c:pt>
+                <c:pt idx="141">
+                  <c:v>0.41</c:v>
+                </c:pt>
+                <c:pt idx="142">
+                  <c:v>0.42</c:v>
+                </c:pt>
+                <c:pt idx="143">
+                  <c:v>0.43</c:v>
+                </c:pt>
+                <c:pt idx="144">
+                  <c:v>0.44</c:v>
+                </c:pt>
+                <c:pt idx="145">
+                  <c:v>0.45</c:v>
+                </c:pt>
+                <c:pt idx="146">
+                  <c:v>0.46</c:v>
+                </c:pt>
+                <c:pt idx="147">
+                  <c:v>0.47</c:v>
+                </c:pt>
+                <c:pt idx="148">
+                  <c:v>0.48</c:v>
+                </c:pt>
+                <c:pt idx="149">
+                  <c:v>0.49</c:v>
+                </c:pt>
+                <c:pt idx="150">
+                  <c:v>0.5</c:v>
+                </c:pt>
+                <c:pt idx="151">
+                  <c:v>0.51</c:v>
+                </c:pt>
+                <c:pt idx="152">
+                  <c:v>0.52</c:v>
+                </c:pt>
+                <c:pt idx="153">
+                  <c:v>0.53</c:v>
+                </c:pt>
+                <c:pt idx="154">
+                  <c:v>0.54</c:v>
+                </c:pt>
+                <c:pt idx="155">
+                  <c:v>0.55000000000000004</c:v>
+                </c:pt>
+                <c:pt idx="156">
+                  <c:v>0.56000000000000005</c:v>
+                </c:pt>
+                <c:pt idx="157">
+                  <c:v>0.56999999999999995</c:v>
+                </c:pt>
+                <c:pt idx="158">
+                  <c:v>0.57999999999999996</c:v>
+                </c:pt>
+                <c:pt idx="159">
+                  <c:v>0.59</c:v>
+                </c:pt>
+                <c:pt idx="160">
+                  <c:v>0.6</c:v>
+                </c:pt>
+                <c:pt idx="161">
+                  <c:v>0.61</c:v>
+                </c:pt>
+                <c:pt idx="162">
+                  <c:v>0.62</c:v>
+                </c:pt>
+                <c:pt idx="163">
+                  <c:v>0.63</c:v>
+                </c:pt>
+                <c:pt idx="164">
+                  <c:v>0.64</c:v>
+                </c:pt>
+                <c:pt idx="165">
+                  <c:v>0.65</c:v>
+                </c:pt>
+                <c:pt idx="166">
+                  <c:v>0.66</c:v>
+                </c:pt>
+                <c:pt idx="167">
+                  <c:v>0.67</c:v>
+                </c:pt>
+                <c:pt idx="168">
+                  <c:v>0.68</c:v>
+                </c:pt>
+                <c:pt idx="169">
+                  <c:v>0.69</c:v>
+                </c:pt>
+                <c:pt idx="170">
+                  <c:v>0.7</c:v>
+                </c:pt>
+                <c:pt idx="171">
+                  <c:v>0.71</c:v>
+                </c:pt>
+                <c:pt idx="172">
+                  <c:v>0.72</c:v>
+                </c:pt>
+                <c:pt idx="173">
+                  <c:v>0.73</c:v>
+                </c:pt>
+                <c:pt idx="174">
+                  <c:v>0.74</c:v>
+                </c:pt>
+                <c:pt idx="175">
+                  <c:v>0.75</c:v>
+                </c:pt>
+                <c:pt idx="176">
+                  <c:v>0.76</c:v>
+                </c:pt>
+                <c:pt idx="177">
+                  <c:v>0.77</c:v>
+                </c:pt>
+                <c:pt idx="178">
+                  <c:v>0.78</c:v>
+                </c:pt>
+                <c:pt idx="179">
+                  <c:v>0.79</c:v>
+                </c:pt>
+                <c:pt idx="180">
+                  <c:v>0.8</c:v>
+                </c:pt>
+                <c:pt idx="181">
+                  <c:v>0.81</c:v>
+                </c:pt>
+                <c:pt idx="182">
+                  <c:v>0.82</c:v>
+                </c:pt>
+                <c:pt idx="183">
+                  <c:v>0.83</c:v>
+                </c:pt>
+                <c:pt idx="184">
+                  <c:v>0.84</c:v>
+                </c:pt>
+                <c:pt idx="185">
+                  <c:v>0.85</c:v>
+                </c:pt>
+                <c:pt idx="186">
+                  <c:v>0.86</c:v>
+                </c:pt>
+                <c:pt idx="187">
+                  <c:v>0.87</c:v>
+                </c:pt>
+                <c:pt idx="188">
+                  <c:v>0.88</c:v>
+                </c:pt>
+                <c:pt idx="189">
+                  <c:v>0.89</c:v>
+                </c:pt>
+                <c:pt idx="190">
+                  <c:v>0.9</c:v>
+                </c:pt>
+                <c:pt idx="191">
+                  <c:v>0.91</c:v>
+                </c:pt>
+                <c:pt idx="192">
+                  <c:v>0.92</c:v>
+                </c:pt>
+                <c:pt idx="193">
+                  <c:v>0.93</c:v>
+                </c:pt>
+                <c:pt idx="194">
+                  <c:v>0.94</c:v>
+                </c:pt>
+                <c:pt idx="195">
+                  <c:v>0.95</c:v>
+                </c:pt>
+                <c:pt idx="196">
+                  <c:v>0.96</c:v>
+                </c:pt>
+                <c:pt idx="197">
+                  <c:v>0.97</c:v>
+                </c:pt>
+                <c:pt idx="198">
+                  <c:v>0.98</c:v>
+                </c:pt>
+                <c:pt idx="199">
+                  <c:v>0.99</c:v>
+                </c:pt>
+                <c:pt idx="200">
+                  <c:v>1</c:v>
+                </c:pt>
+              </c:numCache>
+            </c:numRef>
+          </c:xVal>
+          <c:yVal>
+            <c:numRef>
+              <c:f>Sheet1!$B$3:$B$203</c:f>
+              <c:numCache>
+                <c:formatCode>General</c:formatCode>
+                <c:ptCount val="201"/>
+                <c:pt idx="0">
+                  <c:v>-1</c:v>
+                </c:pt>
+                <c:pt idx="1">
+                  <c:v>-0.99</c:v>
+                </c:pt>
+                <c:pt idx="2">
+                  <c:v>-0.98</c:v>
+                </c:pt>
+                <c:pt idx="3">
+                  <c:v>-0.97</c:v>
+                </c:pt>
+                <c:pt idx="4">
+                  <c:v>-0.96</c:v>
+                </c:pt>
+                <c:pt idx="5">
+                  <c:v>-0.95</c:v>
+                </c:pt>
+                <c:pt idx="6">
+                  <c:v>-0.94</c:v>
+                </c:pt>
+                <c:pt idx="7">
+                  <c:v>-0.93</c:v>
+                </c:pt>
+                <c:pt idx="8">
+                  <c:v>-0.92</c:v>
+                </c:pt>
+                <c:pt idx="9">
+                  <c:v>-0.91</c:v>
+                </c:pt>
+                <c:pt idx="10">
+                  <c:v>-0.9</c:v>
+                </c:pt>
+                <c:pt idx="11">
+                  <c:v>-0.89</c:v>
+                </c:pt>
+                <c:pt idx="12">
+                  <c:v>-0.88</c:v>
+                </c:pt>
+                <c:pt idx="13">
+                  <c:v>-0.87</c:v>
+                </c:pt>
+                <c:pt idx="14">
+                  <c:v>-0.86</c:v>
+                </c:pt>
+                <c:pt idx="15">
+                  <c:v>-0.85</c:v>
+                </c:pt>
+                <c:pt idx="16">
+                  <c:v>-0.84</c:v>
+                </c:pt>
+                <c:pt idx="17">
+                  <c:v>-0.83</c:v>
+                </c:pt>
+                <c:pt idx="18">
+                  <c:v>-0.82</c:v>
+                </c:pt>
+                <c:pt idx="19">
+                  <c:v>-0.81</c:v>
+                </c:pt>
+                <c:pt idx="20">
+                  <c:v>-0.8</c:v>
+                </c:pt>
+                <c:pt idx="21">
+                  <c:v>-0.79</c:v>
+                </c:pt>
+                <c:pt idx="22">
+                  <c:v>-0.78</c:v>
+                </c:pt>
+                <c:pt idx="23">
+                  <c:v>-0.77</c:v>
+                </c:pt>
+                <c:pt idx="24">
+                  <c:v>-0.76</c:v>
+                </c:pt>
+                <c:pt idx="25">
+                  <c:v>-0.75</c:v>
+                </c:pt>
+                <c:pt idx="26">
+                  <c:v>-0.74</c:v>
+                </c:pt>
+                <c:pt idx="27">
+                  <c:v>-0.73</c:v>
+                </c:pt>
+                <c:pt idx="28">
+                  <c:v>-0.72</c:v>
+                </c:pt>
+                <c:pt idx="29">
+                  <c:v>-0.71</c:v>
+                </c:pt>
+                <c:pt idx="30">
+                  <c:v>-0.7</c:v>
+                </c:pt>
+                <c:pt idx="31">
+                  <c:v>-0.69</c:v>
+                </c:pt>
+                <c:pt idx="32">
+                  <c:v>-0.68</c:v>
+                </c:pt>
+                <c:pt idx="33">
+                  <c:v>-0.67</c:v>
+                </c:pt>
+                <c:pt idx="34">
+                  <c:v>-0.66</c:v>
+                </c:pt>
+                <c:pt idx="35">
+                  <c:v>-0.65</c:v>
+                </c:pt>
+                <c:pt idx="36">
+                  <c:v>-0.64</c:v>
+                </c:pt>
+                <c:pt idx="37">
+                  <c:v>-0.63</c:v>
+                </c:pt>
+                <c:pt idx="38">
+                  <c:v>-0.62</c:v>
+                </c:pt>
+                <c:pt idx="39">
+                  <c:v>-0.61</c:v>
+                </c:pt>
+                <c:pt idx="40">
+                  <c:v>-0.6</c:v>
+                </c:pt>
+                <c:pt idx="41">
+                  <c:v>-0.59</c:v>
+                </c:pt>
+                <c:pt idx="42">
+                  <c:v>-0.57999999999999996</c:v>
+                </c:pt>
+                <c:pt idx="43">
+                  <c:v>-0.56999999999999995</c:v>
+                </c:pt>
+                <c:pt idx="44">
+                  <c:v>-0.56000000000000005</c:v>
+                </c:pt>
+                <c:pt idx="45">
+                  <c:v>-0.55000000000000004</c:v>
+                </c:pt>
+                <c:pt idx="46">
+                  <c:v>-0.54</c:v>
+                </c:pt>
+                <c:pt idx="47">
+                  <c:v>-0.53</c:v>
+                </c:pt>
+                <c:pt idx="48">
+                  <c:v>-0.52</c:v>
+                </c:pt>
+                <c:pt idx="49">
+                  <c:v>-0.51</c:v>
+                </c:pt>
+                <c:pt idx="50">
+                  <c:v>-0.5</c:v>
+                </c:pt>
+                <c:pt idx="51">
+                  <c:v>-0.49</c:v>
+                </c:pt>
+                <c:pt idx="52">
+                  <c:v>-0.48</c:v>
+                </c:pt>
+                <c:pt idx="53">
+                  <c:v>-0.47</c:v>
+                </c:pt>
+                <c:pt idx="54">
+                  <c:v>-0.46</c:v>
+                </c:pt>
+                <c:pt idx="55">
+                  <c:v>-0.45</c:v>
+                </c:pt>
+                <c:pt idx="56">
+                  <c:v>-0.44</c:v>
+                </c:pt>
+                <c:pt idx="57">
+                  <c:v>-0.42999999999999899</c:v>
+                </c:pt>
+                <c:pt idx="58">
+                  <c:v>-0.41999999999999899</c:v>
+                </c:pt>
+                <c:pt idx="59">
+                  <c:v>-0.40999999999999898</c:v>
+                </c:pt>
+                <c:pt idx="60">
+                  <c:v>-0.39999999999999902</c:v>
+                </c:pt>
+                <c:pt idx="61">
+                  <c:v>-0.38999999999999901</c:v>
+                </c:pt>
+                <c:pt idx="62">
+                  <c:v>-0.37999999999999901</c:v>
+                </c:pt>
+                <c:pt idx="63">
+                  <c:v>-0.369999999999999</c:v>
+                </c:pt>
+                <c:pt idx="64">
+                  <c:v>-0.35999999999999899</c:v>
+                </c:pt>
+                <c:pt idx="65">
+                  <c:v>-0.34999999999999898</c:v>
+                </c:pt>
+                <c:pt idx="66">
+                  <c:v>-0.33999999999999903</c:v>
+                </c:pt>
+                <c:pt idx="67">
+                  <c:v>-0.32999999999999902</c:v>
+                </c:pt>
+                <c:pt idx="68">
+                  <c:v>-0.31999999999999901</c:v>
+                </c:pt>
+                <c:pt idx="69">
+                  <c:v>-0.309999999999999</c:v>
+                </c:pt>
+                <c:pt idx="70">
+                  <c:v>-0.29999999999999899</c:v>
+                </c:pt>
+                <c:pt idx="71">
+                  <c:v>-0.28999999999999898</c:v>
+                </c:pt>
+                <c:pt idx="72">
+                  <c:v>-0.27999999999999903</c:v>
+                </c:pt>
+                <c:pt idx="73">
+                  <c:v>-0.26999999999999902</c:v>
+                </c:pt>
+                <c:pt idx="74">
+                  <c:v>-0.25999999999999901</c:v>
+                </c:pt>
+                <c:pt idx="75">
+                  <c:v>-0.249999999999999</c:v>
+                </c:pt>
+                <c:pt idx="76">
+                  <c:v>-0.23999999999999899</c:v>
+                </c:pt>
+                <c:pt idx="77">
+                  <c:v>-0.22999999999999901</c:v>
+                </c:pt>
+                <c:pt idx="78">
+                  <c:v>-0.219999999999999</c:v>
+                </c:pt>
+                <c:pt idx="79">
+                  <c:v>-0.20999999999999899</c:v>
+                </c:pt>
+                <c:pt idx="80">
+                  <c:v>0</c:v>
+                </c:pt>
+                <c:pt idx="81">
+                  <c:v>0</c:v>
+                </c:pt>
+                <c:pt idx="82">
+                  <c:v>0</c:v>
+                </c:pt>
+                <c:pt idx="83">
+                  <c:v>0</c:v>
+                </c:pt>
+                <c:pt idx="84">
+                  <c:v>0</c:v>
+                </c:pt>
+                <c:pt idx="85">
+                  <c:v>0</c:v>
+                </c:pt>
+                <c:pt idx="86">
+                  <c:v>0</c:v>
+                </c:pt>
+                <c:pt idx="87">
+                  <c:v>0</c:v>
+                </c:pt>
+                <c:pt idx="88">
+                  <c:v>0</c:v>
+                </c:pt>
+                <c:pt idx="89">
+                  <c:v>0</c:v>
+                </c:pt>
+                <c:pt idx="90">
+                  <c:v>0</c:v>
+                </c:pt>
+                <c:pt idx="91">
+                  <c:v>0</c:v>
+                </c:pt>
+                <c:pt idx="92">
+                  <c:v>0</c:v>
+                </c:pt>
+                <c:pt idx="93">
+                  <c:v>0</c:v>
+                </c:pt>
+                <c:pt idx="94">
+                  <c:v>0</c:v>
+                </c:pt>
+                <c:pt idx="95">
+                  <c:v>0</c:v>
+                </c:pt>
+                <c:pt idx="96">
+                  <c:v>0</c:v>
+                </c:pt>
+                <c:pt idx="97">
+                  <c:v>0</c:v>
+                </c:pt>
+                <c:pt idx="98">
+                  <c:v>0</c:v>
+                </c:pt>
+                <c:pt idx="99">
+                  <c:v>0</c:v>
+                </c:pt>
+                <c:pt idx="100">
+                  <c:v>0</c:v>
+                </c:pt>
+                <c:pt idx="101">
+                  <c:v>0</c:v>
+                </c:pt>
+                <c:pt idx="102">
+                  <c:v>0</c:v>
+                </c:pt>
+                <c:pt idx="103">
+                  <c:v>0</c:v>
+                </c:pt>
+                <c:pt idx="104">
+                  <c:v>0</c:v>
+                </c:pt>
+                <c:pt idx="105">
+                  <c:v>0</c:v>
+                </c:pt>
+                <c:pt idx="106">
+                  <c:v>0</c:v>
+                </c:pt>
+                <c:pt idx="107">
+                  <c:v>0</c:v>
+                </c:pt>
+                <c:pt idx="108">
+                  <c:v>0</c:v>
+                </c:pt>
+                <c:pt idx="109">
+                  <c:v>0</c:v>
+                </c:pt>
+                <c:pt idx="110">
+                  <c:v>0</c:v>
+                </c:pt>
+                <c:pt idx="111">
+                  <c:v>0</c:v>
+                </c:pt>
+                <c:pt idx="112">
+                  <c:v>0</c:v>
+                </c:pt>
+                <c:pt idx="113">
+                  <c:v>0</c:v>
+                </c:pt>
+                <c:pt idx="114">
+                  <c:v>0</c:v>
+                </c:pt>
+                <c:pt idx="115">
+                  <c:v>0</c:v>
+                </c:pt>
+                <c:pt idx="116">
+                  <c:v>0</c:v>
+                </c:pt>
+                <c:pt idx="117">
+                  <c:v>0</c:v>
+                </c:pt>
+                <c:pt idx="118">
+                  <c:v>0</c:v>
+                </c:pt>
+                <c:pt idx="119">
+                  <c:v>0</c:v>
+                </c:pt>
+                <c:pt idx="120">
+                  <c:v>0</c:v>
+                </c:pt>
+                <c:pt idx="121">
+                  <c:v>0.21</c:v>
+                </c:pt>
+                <c:pt idx="122">
+                  <c:v>0.22</c:v>
+                </c:pt>
+                <c:pt idx="123">
+                  <c:v>0.23</c:v>
+                </c:pt>
+                <c:pt idx="124">
+                  <c:v>0.24</c:v>
+                </c:pt>
+                <c:pt idx="125">
+                  <c:v>0.25</c:v>
+                </c:pt>
+                <c:pt idx="126">
+                  <c:v>0.26</c:v>
+                </c:pt>
+                <c:pt idx="127">
+                  <c:v>0.27</c:v>
+                </c:pt>
+                <c:pt idx="128">
+                  <c:v>0.28000000000000003</c:v>
+                </c:pt>
+                <c:pt idx="129">
+                  <c:v>0.28999999999999998</c:v>
+                </c:pt>
+                <c:pt idx="130">
+                  <c:v>0.3</c:v>
+                </c:pt>
+                <c:pt idx="131">
+                  <c:v>0.31</c:v>
+                </c:pt>
+                <c:pt idx="132">
+                  <c:v>0.32</c:v>
+                </c:pt>
+                <c:pt idx="133">
+                  <c:v>0.33</c:v>
+                </c:pt>
+                <c:pt idx="134">
+                  <c:v>0.34</c:v>
+                </c:pt>
+                <c:pt idx="135">
+                  <c:v>0.35</c:v>
+                </c:pt>
+                <c:pt idx="136">
+                  <c:v>0.36</c:v>
+                </c:pt>
+                <c:pt idx="137">
+                  <c:v>0.37</c:v>
+                </c:pt>
+                <c:pt idx="138">
+                  <c:v>0.38</c:v>
+                </c:pt>
+                <c:pt idx="139">
+                  <c:v>0.39</c:v>
+                </c:pt>
+                <c:pt idx="140">
+                  <c:v>0.4</c:v>
+                </c:pt>
+                <c:pt idx="141">
+                  <c:v>0.41</c:v>
+                </c:pt>
+                <c:pt idx="142">
+                  <c:v>0.42</c:v>
+                </c:pt>
+                <c:pt idx="143">
+                  <c:v>0.43</c:v>
+                </c:pt>
+                <c:pt idx="144">
+                  <c:v>0.44</c:v>
+                </c:pt>
+                <c:pt idx="145">
+                  <c:v>0.45</c:v>
+                </c:pt>
+                <c:pt idx="146">
+                  <c:v>0.46</c:v>
+                </c:pt>
+                <c:pt idx="147">
+                  <c:v>0.47</c:v>
+                </c:pt>
+                <c:pt idx="148">
+                  <c:v>0.48</c:v>
+                </c:pt>
+                <c:pt idx="149">
+                  <c:v>0.49</c:v>
+                </c:pt>
+                <c:pt idx="150">
+                  <c:v>0.5</c:v>
+                </c:pt>
+                <c:pt idx="151">
+                  <c:v>0.51</c:v>
+                </c:pt>
+                <c:pt idx="152">
+                  <c:v>0.52</c:v>
+                </c:pt>
+                <c:pt idx="153">
+                  <c:v>0.53</c:v>
+                </c:pt>
+                <c:pt idx="154">
+                  <c:v>0.54</c:v>
+                </c:pt>
+                <c:pt idx="155">
+                  <c:v>0.55000000000000004</c:v>
+                </c:pt>
+                <c:pt idx="156">
+                  <c:v>0.56000000000000005</c:v>
+                </c:pt>
+                <c:pt idx="157">
+                  <c:v>0.56999999999999995</c:v>
+                </c:pt>
+                <c:pt idx="158">
+                  <c:v>0.57999999999999996</c:v>
+                </c:pt>
+                <c:pt idx="159">
+                  <c:v>0.59</c:v>
+                </c:pt>
+                <c:pt idx="160">
+                  <c:v>0.6</c:v>
+                </c:pt>
+                <c:pt idx="161">
+                  <c:v>0.61</c:v>
+                </c:pt>
+                <c:pt idx="162">
+                  <c:v>0.62</c:v>
+                </c:pt>
+                <c:pt idx="163">
+                  <c:v>0.63</c:v>
+                </c:pt>
+                <c:pt idx="164">
+                  <c:v>0.64</c:v>
+                </c:pt>
+                <c:pt idx="165">
+                  <c:v>0.65</c:v>
+                </c:pt>
+                <c:pt idx="166">
+                  <c:v>0.66</c:v>
+                </c:pt>
+                <c:pt idx="167">
+                  <c:v>0.67</c:v>
+                </c:pt>
+                <c:pt idx="168">
+                  <c:v>0.68</c:v>
+                </c:pt>
+                <c:pt idx="169">
+                  <c:v>0.69</c:v>
+                </c:pt>
+                <c:pt idx="170">
+                  <c:v>0.7</c:v>
+                </c:pt>
+                <c:pt idx="171">
+                  <c:v>0.71</c:v>
+                </c:pt>
+                <c:pt idx="172">
+                  <c:v>0.72</c:v>
+                </c:pt>
+                <c:pt idx="173">
+                  <c:v>0.73</c:v>
+                </c:pt>
+                <c:pt idx="174">
+                  <c:v>0.74</c:v>
+                </c:pt>
+                <c:pt idx="175">
+                  <c:v>0.75</c:v>
+                </c:pt>
+                <c:pt idx="176">
+                  <c:v>0.76</c:v>
+                </c:pt>
+                <c:pt idx="177">
+                  <c:v>0.77</c:v>
+                </c:pt>
+                <c:pt idx="178">
+                  <c:v>0.78</c:v>
+                </c:pt>
+                <c:pt idx="179">
+                  <c:v>0.79</c:v>
+                </c:pt>
+                <c:pt idx="180">
+                  <c:v>0.8</c:v>
+                </c:pt>
+                <c:pt idx="181">
+                  <c:v>0.81</c:v>
+                </c:pt>
+                <c:pt idx="182">
+                  <c:v>0.82</c:v>
+                </c:pt>
+                <c:pt idx="183">
+                  <c:v>0.83</c:v>
+                </c:pt>
+                <c:pt idx="184">
+                  <c:v>0.84</c:v>
+                </c:pt>
+                <c:pt idx="185">
+                  <c:v>0.85</c:v>
+                </c:pt>
+                <c:pt idx="186">
+                  <c:v>0.86</c:v>
+                </c:pt>
+                <c:pt idx="187">
+                  <c:v>0.87</c:v>
+                </c:pt>
+                <c:pt idx="188">
+                  <c:v>0.88</c:v>
+                </c:pt>
+                <c:pt idx="189">
+                  <c:v>0.89</c:v>
+                </c:pt>
+                <c:pt idx="190">
+                  <c:v>0.9</c:v>
+                </c:pt>
+                <c:pt idx="191">
+                  <c:v>0.91</c:v>
+                </c:pt>
+                <c:pt idx="192">
+                  <c:v>0.92</c:v>
+                </c:pt>
+                <c:pt idx="193">
+                  <c:v>0.93</c:v>
+                </c:pt>
+                <c:pt idx="194">
+                  <c:v>0.94</c:v>
+                </c:pt>
+                <c:pt idx="195">
+                  <c:v>0.95</c:v>
+                </c:pt>
+                <c:pt idx="196">
+                  <c:v>0.96</c:v>
+                </c:pt>
+                <c:pt idx="197">
+                  <c:v>0.97</c:v>
+                </c:pt>
+                <c:pt idx="198">
+                  <c:v>0.98</c:v>
+                </c:pt>
+                <c:pt idx="199">
+                  <c:v>0.99</c:v>
+                </c:pt>
+                <c:pt idx="200">
+                  <c:v>1</c:v>
+                </c:pt>
+              </c:numCache>
+            </c:numRef>
+          </c:yVal>
+          <c:smooth val="0"/>
+          <c:extLst>
+            <c:ext xmlns:c16="http://schemas.microsoft.com/office/drawing/2014/chart" uri="{C3380CC4-5D6E-409C-BE32-E72D297353CC}">
+              <c16:uniqueId val="{00000000-426E-43ED-A050-4BC63809F845}"/>
+            </c:ext>
+          </c:extLst>
+        </c:ser>
+        <c:ser>
+          <c:idx val="1"/>
+          <c:order val="1"/>
+          <c:tx>
+            <c:strRef>
+              <c:f>Sheet1!$C$2</c:f>
+              <c:strCache>
+                <c:ptCount val="1"/>
+                <c:pt idx="0">
+                  <c:v>Squared Power Output</c:v>
+                </c:pt>
+              </c:strCache>
+            </c:strRef>
+          </c:tx>
+          <c:spPr>
+            <a:ln w="19050" cap="rnd">
+              <a:solidFill>
+                <a:schemeClr val="accent2"/>
+              </a:solidFill>
+              <a:round/>
+            </a:ln>
+            <a:effectLst/>
+          </c:spPr>
+          <c:marker>
+            <c:symbol val="none"/>
+          </c:marker>
+          <c:xVal>
+            <c:numRef>
+              <c:f>Sheet1!$A$3:$A$203</c:f>
+              <c:numCache>
+                <c:formatCode>General</c:formatCode>
+                <c:ptCount val="201"/>
+                <c:pt idx="0">
+                  <c:v>-1</c:v>
+                </c:pt>
+                <c:pt idx="1">
+                  <c:v>-0.99</c:v>
+                </c:pt>
+                <c:pt idx="2">
+                  <c:v>-0.98</c:v>
+                </c:pt>
+                <c:pt idx="3">
+                  <c:v>-0.97</c:v>
+                </c:pt>
+                <c:pt idx="4">
+                  <c:v>-0.96</c:v>
+                </c:pt>
+                <c:pt idx="5">
+                  <c:v>-0.95</c:v>
+                </c:pt>
+                <c:pt idx="6">
+                  <c:v>-0.94</c:v>
+                </c:pt>
+                <c:pt idx="7">
+                  <c:v>-0.93</c:v>
+                </c:pt>
+                <c:pt idx="8">
+                  <c:v>-0.92</c:v>
+                </c:pt>
+                <c:pt idx="9">
+                  <c:v>-0.91</c:v>
+                </c:pt>
+                <c:pt idx="10">
+                  <c:v>-0.9</c:v>
+                </c:pt>
+                <c:pt idx="11">
+                  <c:v>-0.89</c:v>
+                </c:pt>
+                <c:pt idx="12">
+                  <c:v>-0.88</c:v>
+                </c:pt>
+                <c:pt idx="13">
+                  <c:v>-0.87</c:v>
+                </c:pt>
+                <c:pt idx="14">
+                  <c:v>-0.86</c:v>
+                </c:pt>
+                <c:pt idx="15">
+                  <c:v>-0.85</c:v>
+                </c:pt>
+                <c:pt idx="16">
+                  <c:v>-0.84</c:v>
+                </c:pt>
+                <c:pt idx="17">
+                  <c:v>-0.83</c:v>
+                </c:pt>
+                <c:pt idx="18">
+                  <c:v>-0.82</c:v>
+                </c:pt>
+                <c:pt idx="19">
+                  <c:v>-0.81</c:v>
+                </c:pt>
+                <c:pt idx="20">
+                  <c:v>-0.8</c:v>
+                </c:pt>
+                <c:pt idx="21">
+                  <c:v>-0.79</c:v>
+                </c:pt>
+                <c:pt idx="22">
+                  <c:v>-0.78</c:v>
+                </c:pt>
+                <c:pt idx="23">
+                  <c:v>-0.77</c:v>
+                </c:pt>
+                <c:pt idx="24">
+                  <c:v>-0.76</c:v>
+                </c:pt>
+                <c:pt idx="25">
+                  <c:v>-0.75</c:v>
+                </c:pt>
+                <c:pt idx="26">
+                  <c:v>-0.74</c:v>
+                </c:pt>
+                <c:pt idx="27">
+                  <c:v>-0.73</c:v>
+                </c:pt>
+                <c:pt idx="28">
+                  <c:v>-0.72</c:v>
+                </c:pt>
+                <c:pt idx="29">
+                  <c:v>-0.71</c:v>
+                </c:pt>
+                <c:pt idx="30">
+                  <c:v>-0.7</c:v>
+                </c:pt>
+                <c:pt idx="31">
+                  <c:v>-0.69</c:v>
+                </c:pt>
+                <c:pt idx="32">
+                  <c:v>-0.68</c:v>
+                </c:pt>
+                <c:pt idx="33">
+                  <c:v>-0.67</c:v>
+                </c:pt>
+                <c:pt idx="34">
+                  <c:v>-0.66</c:v>
+                </c:pt>
+                <c:pt idx="35">
+                  <c:v>-0.65</c:v>
+                </c:pt>
+                <c:pt idx="36">
+                  <c:v>-0.64</c:v>
+                </c:pt>
+                <c:pt idx="37">
+                  <c:v>-0.63</c:v>
+                </c:pt>
+                <c:pt idx="38">
+                  <c:v>-0.62</c:v>
+                </c:pt>
+                <c:pt idx="39">
+                  <c:v>-0.61</c:v>
+                </c:pt>
+                <c:pt idx="40">
+                  <c:v>-0.6</c:v>
+                </c:pt>
+                <c:pt idx="41">
+                  <c:v>-0.59</c:v>
+                </c:pt>
+                <c:pt idx="42">
+                  <c:v>-0.57999999999999996</c:v>
+                </c:pt>
+                <c:pt idx="43">
+                  <c:v>-0.56999999999999995</c:v>
+                </c:pt>
+                <c:pt idx="44">
+                  <c:v>-0.56000000000000005</c:v>
+                </c:pt>
+                <c:pt idx="45">
+                  <c:v>-0.55000000000000004</c:v>
+                </c:pt>
+                <c:pt idx="46">
+                  <c:v>-0.54</c:v>
+                </c:pt>
+                <c:pt idx="47">
+                  <c:v>-0.53</c:v>
+                </c:pt>
+                <c:pt idx="48">
+                  <c:v>-0.52</c:v>
+                </c:pt>
+                <c:pt idx="49">
+                  <c:v>-0.51</c:v>
+                </c:pt>
+                <c:pt idx="50">
+                  <c:v>-0.5</c:v>
+                </c:pt>
+                <c:pt idx="51">
+                  <c:v>-0.49</c:v>
+                </c:pt>
+                <c:pt idx="52">
+                  <c:v>-0.48</c:v>
+                </c:pt>
+                <c:pt idx="53">
+                  <c:v>-0.47</c:v>
+                </c:pt>
+                <c:pt idx="54">
+                  <c:v>-0.46</c:v>
+                </c:pt>
+                <c:pt idx="55">
+                  <c:v>-0.45</c:v>
+                </c:pt>
+                <c:pt idx="56">
+                  <c:v>-0.44</c:v>
+                </c:pt>
+                <c:pt idx="57">
+                  <c:v>-0.42999999999999899</c:v>
+                </c:pt>
+                <c:pt idx="58">
+                  <c:v>-0.41999999999999899</c:v>
+                </c:pt>
+                <c:pt idx="59">
+                  <c:v>-0.40999999999999898</c:v>
+                </c:pt>
+                <c:pt idx="60">
+                  <c:v>-0.39999999999999902</c:v>
+                </c:pt>
+                <c:pt idx="61">
+                  <c:v>-0.38999999999999901</c:v>
+                </c:pt>
+                <c:pt idx="62">
+                  <c:v>-0.37999999999999901</c:v>
+                </c:pt>
+                <c:pt idx="63">
+                  <c:v>-0.369999999999999</c:v>
+                </c:pt>
+                <c:pt idx="64">
+                  <c:v>-0.35999999999999899</c:v>
+                </c:pt>
+                <c:pt idx="65">
+                  <c:v>-0.34999999999999898</c:v>
+                </c:pt>
+                <c:pt idx="66">
+                  <c:v>-0.33999999999999903</c:v>
+                </c:pt>
+                <c:pt idx="67">
+                  <c:v>-0.32999999999999902</c:v>
+                </c:pt>
+                <c:pt idx="68">
+                  <c:v>-0.31999999999999901</c:v>
+                </c:pt>
+                <c:pt idx="69">
+                  <c:v>-0.309999999999999</c:v>
+                </c:pt>
+                <c:pt idx="70">
+                  <c:v>-0.29999999999999899</c:v>
+                </c:pt>
+                <c:pt idx="71">
+                  <c:v>-0.28999999999999898</c:v>
+                </c:pt>
+                <c:pt idx="72">
+                  <c:v>-0.27999999999999903</c:v>
+                </c:pt>
+                <c:pt idx="73">
+                  <c:v>-0.26999999999999902</c:v>
+                </c:pt>
+                <c:pt idx="74">
+                  <c:v>-0.25999999999999901</c:v>
+                </c:pt>
+                <c:pt idx="75">
+                  <c:v>-0.249999999999999</c:v>
+                </c:pt>
+                <c:pt idx="76">
+                  <c:v>-0.23999999999999899</c:v>
+                </c:pt>
+                <c:pt idx="77">
+                  <c:v>-0.22999999999999901</c:v>
+                </c:pt>
+                <c:pt idx="78">
+                  <c:v>-0.219999999999999</c:v>
+                </c:pt>
+                <c:pt idx="79">
+                  <c:v>-0.20999999999999899</c:v>
+                </c:pt>
+                <c:pt idx="80">
+                  <c:v>-0.19999999999999901</c:v>
+                </c:pt>
+                <c:pt idx="81">
+                  <c:v>-0.189999999999999</c:v>
+                </c:pt>
+                <c:pt idx="82">
+                  <c:v>-0.17999999999999899</c:v>
+                </c:pt>
+                <c:pt idx="83">
+                  <c:v>-0.16999999999999901</c:v>
+                </c:pt>
+                <c:pt idx="84">
+                  <c:v>-0.159999999999999</c:v>
+                </c:pt>
+                <c:pt idx="85">
+                  <c:v>-0.149999999999999</c:v>
+                </c:pt>
+                <c:pt idx="86">
+                  <c:v>-0.13999999999999899</c:v>
+                </c:pt>
+                <c:pt idx="87">
+                  <c:v>-0.12999999999999901</c:v>
+                </c:pt>
+                <c:pt idx="88">
+                  <c:v>-0.119999999999999</c:v>
+                </c:pt>
+                <c:pt idx="89">
+                  <c:v>-0.109999999999999</c:v>
+                </c:pt>
+                <c:pt idx="90">
+                  <c:v>-9.9999999999999006E-2</c:v>
+                </c:pt>
+                <c:pt idx="91">
+                  <c:v>-8.9999999999998997E-2</c:v>
+                </c:pt>
+                <c:pt idx="92">
+                  <c:v>-7.9999999999999002E-2</c:v>
+                </c:pt>
+                <c:pt idx="93">
+                  <c:v>-6.9999999999998994E-2</c:v>
+                </c:pt>
+                <c:pt idx="94">
+                  <c:v>-5.9999999999999103E-2</c:v>
+                </c:pt>
+                <c:pt idx="95">
+                  <c:v>-4.9999999999998997E-2</c:v>
+                </c:pt>
+                <c:pt idx="96">
+                  <c:v>-3.9999999999999002E-2</c:v>
+                </c:pt>
+                <c:pt idx="97">
+                  <c:v>-2.9999999999999E-2</c:v>
+                </c:pt>
+                <c:pt idx="98">
+                  <c:v>-1.9999999999999001E-2</c:v>
+                </c:pt>
+                <c:pt idx="99">
+                  <c:v>-9.9999999999990097E-3</c:v>
+                </c:pt>
+                <c:pt idx="100">
+                  <c:v>0</c:v>
+                </c:pt>
+                <c:pt idx="101">
+                  <c:v>0.01</c:v>
+                </c:pt>
+                <c:pt idx="102">
+                  <c:v>0.02</c:v>
+                </c:pt>
+                <c:pt idx="103">
+                  <c:v>0.03</c:v>
+                </c:pt>
+                <c:pt idx="104">
+                  <c:v>0.04</c:v>
+                </c:pt>
+                <c:pt idx="105">
+                  <c:v>0.05</c:v>
+                </c:pt>
+                <c:pt idx="106">
+                  <c:v>6.0000000000000102E-2</c:v>
+                </c:pt>
+                <c:pt idx="107">
+                  <c:v>7.0000000000000104E-2</c:v>
+                </c:pt>
+                <c:pt idx="108">
+                  <c:v>8.0000000000000099E-2</c:v>
+                </c:pt>
+                <c:pt idx="109">
+                  <c:v>9.0000000000000094E-2</c:v>
+                </c:pt>
+                <c:pt idx="110">
+                  <c:v>0.1</c:v>
+                </c:pt>
+                <c:pt idx="111">
+                  <c:v>0.11</c:v>
+                </c:pt>
+                <c:pt idx="112">
+                  <c:v>0.12</c:v>
+                </c:pt>
+                <c:pt idx="113">
+                  <c:v>0.13</c:v>
+                </c:pt>
+                <c:pt idx="114">
+                  <c:v>0.14000000000000001</c:v>
+                </c:pt>
+                <c:pt idx="115">
+                  <c:v>0.15</c:v>
+                </c:pt>
+                <c:pt idx="116">
+                  <c:v>0.16</c:v>
+                </c:pt>
+                <c:pt idx="117">
+                  <c:v>0.17</c:v>
+                </c:pt>
+                <c:pt idx="118">
+                  <c:v>0.18</c:v>
+                </c:pt>
+                <c:pt idx="119">
+                  <c:v>0.19</c:v>
+                </c:pt>
+                <c:pt idx="120">
+                  <c:v>0.2</c:v>
+                </c:pt>
+                <c:pt idx="121">
+                  <c:v>0.21</c:v>
+                </c:pt>
+                <c:pt idx="122">
+                  <c:v>0.22</c:v>
+                </c:pt>
+                <c:pt idx="123">
+                  <c:v>0.23</c:v>
+                </c:pt>
+                <c:pt idx="124">
+                  <c:v>0.24</c:v>
+                </c:pt>
+                <c:pt idx="125">
+                  <c:v>0.25</c:v>
+                </c:pt>
+                <c:pt idx="126">
+                  <c:v>0.26</c:v>
+                </c:pt>
+                <c:pt idx="127">
+                  <c:v>0.27</c:v>
+                </c:pt>
+                <c:pt idx="128">
+                  <c:v>0.28000000000000003</c:v>
+                </c:pt>
+                <c:pt idx="129">
+                  <c:v>0.28999999999999998</c:v>
+                </c:pt>
+                <c:pt idx="130">
+                  <c:v>0.3</c:v>
+                </c:pt>
+                <c:pt idx="131">
+                  <c:v>0.31</c:v>
+                </c:pt>
+                <c:pt idx="132">
+                  <c:v>0.32</c:v>
+                </c:pt>
+                <c:pt idx="133">
+                  <c:v>0.33</c:v>
+                </c:pt>
+                <c:pt idx="134">
+                  <c:v>0.34</c:v>
+                </c:pt>
+                <c:pt idx="135">
+                  <c:v>0.35</c:v>
+                </c:pt>
+                <c:pt idx="136">
+                  <c:v>0.36</c:v>
+                </c:pt>
+                <c:pt idx="137">
+                  <c:v>0.37</c:v>
+                </c:pt>
+                <c:pt idx="138">
+                  <c:v>0.38</c:v>
+                </c:pt>
+                <c:pt idx="139">
+                  <c:v>0.39</c:v>
+                </c:pt>
+                <c:pt idx="140">
+                  <c:v>0.4</c:v>
+                </c:pt>
+                <c:pt idx="141">
+                  <c:v>0.41</c:v>
+                </c:pt>
+                <c:pt idx="142">
+                  <c:v>0.42</c:v>
+                </c:pt>
+                <c:pt idx="143">
+                  <c:v>0.43</c:v>
+                </c:pt>
+                <c:pt idx="144">
+                  <c:v>0.44</c:v>
+                </c:pt>
+                <c:pt idx="145">
+                  <c:v>0.45</c:v>
+                </c:pt>
+                <c:pt idx="146">
+                  <c:v>0.46</c:v>
+                </c:pt>
+                <c:pt idx="147">
+                  <c:v>0.47</c:v>
+                </c:pt>
+                <c:pt idx="148">
+                  <c:v>0.48</c:v>
+                </c:pt>
+                <c:pt idx="149">
+                  <c:v>0.49</c:v>
+                </c:pt>
+                <c:pt idx="150">
+                  <c:v>0.5</c:v>
+                </c:pt>
+                <c:pt idx="151">
+                  <c:v>0.51</c:v>
+                </c:pt>
+                <c:pt idx="152">
+                  <c:v>0.52</c:v>
+                </c:pt>
+                <c:pt idx="153">
+                  <c:v>0.53</c:v>
+                </c:pt>
+                <c:pt idx="154">
+                  <c:v>0.54</c:v>
+                </c:pt>
+                <c:pt idx="155">
+                  <c:v>0.55000000000000004</c:v>
+                </c:pt>
+                <c:pt idx="156">
+                  <c:v>0.56000000000000005</c:v>
+                </c:pt>
+                <c:pt idx="157">
+                  <c:v>0.56999999999999995</c:v>
+                </c:pt>
+                <c:pt idx="158">
+                  <c:v>0.57999999999999996</c:v>
+                </c:pt>
+                <c:pt idx="159">
+                  <c:v>0.59</c:v>
+                </c:pt>
+                <c:pt idx="160">
+                  <c:v>0.6</c:v>
+                </c:pt>
+                <c:pt idx="161">
+                  <c:v>0.61</c:v>
+                </c:pt>
+                <c:pt idx="162">
+                  <c:v>0.62</c:v>
+                </c:pt>
+                <c:pt idx="163">
+                  <c:v>0.63</c:v>
+                </c:pt>
+                <c:pt idx="164">
+                  <c:v>0.64</c:v>
+                </c:pt>
+                <c:pt idx="165">
+                  <c:v>0.65</c:v>
+                </c:pt>
+                <c:pt idx="166">
+                  <c:v>0.66</c:v>
+                </c:pt>
+                <c:pt idx="167">
+                  <c:v>0.67</c:v>
+                </c:pt>
+                <c:pt idx="168">
+                  <c:v>0.68</c:v>
+                </c:pt>
+                <c:pt idx="169">
+                  <c:v>0.69</c:v>
+                </c:pt>
+                <c:pt idx="170">
+                  <c:v>0.7</c:v>
+                </c:pt>
+                <c:pt idx="171">
+                  <c:v>0.71</c:v>
+                </c:pt>
+                <c:pt idx="172">
+                  <c:v>0.72</c:v>
+                </c:pt>
+                <c:pt idx="173">
+                  <c:v>0.73</c:v>
+                </c:pt>
+                <c:pt idx="174">
+                  <c:v>0.74</c:v>
+                </c:pt>
+                <c:pt idx="175">
+                  <c:v>0.75</c:v>
+                </c:pt>
+                <c:pt idx="176">
+                  <c:v>0.76</c:v>
+                </c:pt>
+                <c:pt idx="177">
+                  <c:v>0.77</c:v>
+                </c:pt>
+                <c:pt idx="178">
+                  <c:v>0.78</c:v>
+                </c:pt>
+                <c:pt idx="179">
+                  <c:v>0.79</c:v>
+                </c:pt>
+                <c:pt idx="180">
+                  <c:v>0.8</c:v>
+                </c:pt>
+                <c:pt idx="181">
+                  <c:v>0.81</c:v>
+                </c:pt>
+                <c:pt idx="182">
+                  <c:v>0.82</c:v>
+                </c:pt>
+                <c:pt idx="183">
+                  <c:v>0.83</c:v>
+                </c:pt>
+                <c:pt idx="184">
+                  <c:v>0.84</c:v>
+                </c:pt>
+                <c:pt idx="185">
+                  <c:v>0.85</c:v>
+                </c:pt>
+                <c:pt idx="186">
+                  <c:v>0.86</c:v>
+                </c:pt>
+                <c:pt idx="187">
+                  <c:v>0.87</c:v>
+                </c:pt>
+                <c:pt idx="188">
+                  <c:v>0.88</c:v>
+                </c:pt>
+                <c:pt idx="189">
+                  <c:v>0.89</c:v>
+                </c:pt>
+                <c:pt idx="190">
+                  <c:v>0.9</c:v>
+                </c:pt>
+                <c:pt idx="191">
+                  <c:v>0.91</c:v>
+                </c:pt>
+                <c:pt idx="192">
+                  <c:v>0.92</c:v>
+                </c:pt>
+                <c:pt idx="193">
+                  <c:v>0.93</c:v>
+                </c:pt>
+                <c:pt idx="194">
+                  <c:v>0.94</c:v>
+                </c:pt>
+                <c:pt idx="195">
+                  <c:v>0.95</c:v>
+                </c:pt>
+                <c:pt idx="196">
+                  <c:v>0.96</c:v>
+                </c:pt>
+                <c:pt idx="197">
+                  <c:v>0.97</c:v>
+                </c:pt>
+                <c:pt idx="198">
+                  <c:v>0.98</c:v>
+                </c:pt>
+                <c:pt idx="199">
+                  <c:v>0.99</c:v>
+                </c:pt>
+                <c:pt idx="200">
+                  <c:v>1</c:v>
+                </c:pt>
+              </c:numCache>
+            </c:numRef>
+          </c:xVal>
+          <c:yVal>
+            <c:numRef>
+              <c:f>Sheet1!$C$3:$C$203</c:f>
+              <c:numCache>
+                <c:formatCode>General</c:formatCode>
+                <c:ptCount val="201"/>
+                <c:pt idx="0">
+                  <c:v>-1</c:v>
+                </c:pt>
+                <c:pt idx="1">
+                  <c:v>-0.98009999999999997</c:v>
+                </c:pt>
+                <c:pt idx="2">
+                  <c:v>-0.96039999999999992</c:v>
+                </c:pt>
+                <c:pt idx="3">
+                  <c:v>-0.94089999999999996</c:v>
+                </c:pt>
+                <c:pt idx="4">
+                  <c:v>-0.92159999999999997</c:v>
+                </c:pt>
+                <c:pt idx="5">
+                  <c:v>-0.90249999999999997</c:v>
+                </c:pt>
+                <c:pt idx="6">
+                  <c:v>-0.88359999999999994</c:v>
+                </c:pt>
+                <c:pt idx="7">
+                  <c:v>-0.86490000000000011</c:v>
+                </c:pt>
+                <c:pt idx="8">
+                  <c:v>-0.84640000000000004</c:v>
+                </c:pt>
+                <c:pt idx="9">
+                  <c:v>-0.82810000000000006</c:v>
+                </c:pt>
+                <c:pt idx="10">
+                  <c:v>-0.81</c:v>
+                </c:pt>
+                <c:pt idx="11">
+                  <c:v>-0.79210000000000003</c:v>
+                </c:pt>
+                <c:pt idx="12">
+                  <c:v>-0.77439999999999998</c:v>
+                </c:pt>
+                <c:pt idx="13">
+                  <c:v>-0.75690000000000002</c:v>
+                </c:pt>
+                <c:pt idx="14">
+                  <c:v>-0.73959999999999992</c:v>
+                </c:pt>
+                <c:pt idx="15">
+                  <c:v>-0.72249999999999992</c:v>
+                </c:pt>
+                <c:pt idx="16">
+                  <c:v>-0.70559999999999989</c:v>
+                </c:pt>
+                <c:pt idx="17">
+                  <c:v>-0.68889999999999996</c:v>
+                </c:pt>
+                <c:pt idx="18">
+                  <c:v>-0.67239999999999989</c:v>
+                </c:pt>
+                <c:pt idx="19">
+                  <c:v>-0.65610000000000013</c:v>
+                </c:pt>
+                <c:pt idx="20">
+                  <c:v>-0.64000000000000012</c:v>
+                </c:pt>
+                <c:pt idx="21">
+                  <c:v>-0.6241000000000001</c:v>
+                </c:pt>
+                <c:pt idx="22">
+                  <c:v>-0.60840000000000005</c:v>
+                </c:pt>
+                <c:pt idx="23">
+                  <c:v>-0.59289999999999998</c:v>
+                </c:pt>
+                <c:pt idx="24">
+                  <c:v>-0.5776</c:v>
+                </c:pt>
+                <c:pt idx="25">
+                  <c:v>-0.5625</c:v>
+                </c:pt>
+                <c:pt idx="26">
+                  <c:v>-0.54759999999999998</c:v>
+                </c:pt>
+                <c:pt idx="27">
+                  <c:v>-0.53289999999999993</c:v>
+                </c:pt>
+                <c:pt idx="28">
+                  <c:v>-0.51839999999999997</c:v>
+                </c:pt>
+                <c:pt idx="29">
+                  <c:v>-0.50409999999999999</c:v>
+                </c:pt>
+                <c:pt idx="30">
+                  <c:v>-0.48999999999999994</c:v>
+                </c:pt>
+                <c:pt idx="31">
+                  <c:v>-0.47609999999999991</c:v>
+                </c:pt>
+                <c:pt idx="32">
+                  <c:v>-0.46240000000000009</c:v>
+                </c:pt>
+                <c:pt idx="33">
+                  <c:v>-0.44890000000000008</c:v>
+                </c:pt>
+                <c:pt idx="34">
+                  <c:v>-0.43560000000000004</c:v>
+                </c:pt>
+                <c:pt idx="35">
+                  <c:v>-0.42250000000000004</c:v>
+                </c:pt>
+                <c:pt idx="36">
+                  <c:v>-0.40960000000000002</c:v>
+                </c:pt>
+                <c:pt idx="37">
+                  <c:v>-0.39690000000000003</c:v>
+                </c:pt>
+                <c:pt idx="38">
+                  <c:v>-0.38440000000000002</c:v>
+                </c:pt>
+                <c:pt idx="39">
+                  <c:v>-0.37209999999999999</c:v>
+                </c:pt>
+                <c:pt idx="40">
+                  <c:v>-0.36</c:v>
+                </c:pt>
+                <c:pt idx="41">
+                  <c:v>-0.34809999999999997</c:v>
+                </c:pt>
+                <c:pt idx="42">
+                  <c:v>-0.33639999999999998</c:v>
+                </c:pt>
+                <c:pt idx="43">
+                  <c:v>-0.32489999999999997</c:v>
+                </c:pt>
+                <c:pt idx="44">
+                  <c:v>-0.31360000000000005</c:v>
+                </c:pt>
+                <c:pt idx="45">
+                  <c:v>-0.30250000000000005</c:v>
+                </c:pt>
+                <c:pt idx="46">
+                  <c:v>-0.29160000000000003</c:v>
+                </c:pt>
+                <c:pt idx="47">
+                  <c:v>-0.28090000000000004</c:v>
+                </c:pt>
+                <c:pt idx="48">
+                  <c:v>-0.27040000000000003</c:v>
+                </c:pt>
+                <c:pt idx="49">
+                  <c:v>-0.2601</c:v>
+                </c:pt>
+                <c:pt idx="50">
+                  <c:v>-0.25</c:v>
+                </c:pt>
+                <c:pt idx="51">
+                  <c:v>-0.24009999999999998</c:v>
+                </c:pt>
+                <c:pt idx="52">
+                  <c:v>-0.23039999999999999</c:v>
+                </c:pt>
+                <c:pt idx="53">
+                  <c:v>-0.22089999999999999</c:v>
+                </c:pt>
+                <c:pt idx="54">
+                  <c:v>-0.21160000000000001</c:v>
+                </c:pt>
+                <c:pt idx="55">
+                  <c:v>-0.20250000000000001</c:v>
+                </c:pt>
+                <c:pt idx="56">
+                  <c:v>-0.19359999999999999</c:v>
+                </c:pt>
+                <c:pt idx="57">
+                  <c:v>-0.18489999999999915</c:v>
+                </c:pt>
+                <c:pt idx="58">
+                  <c:v>-0.17639999999999914</c:v>
+                </c:pt>
+                <c:pt idx="59">
+                  <c:v>-0.16809999999999917</c:v>
+                </c:pt>
+                <c:pt idx="60">
+                  <c:v>-0.15999999999999923</c:v>
+                </c:pt>
+                <c:pt idx="61">
+                  <c:v>-0.15209999999999924</c:v>
+                </c:pt>
+                <c:pt idx="62">
+                  <c:v>-0.14439999999999925</c:v>
+                </c:pt>
+                <c:pt idx="63">
+                  <c:v>-0.13689999999999924</c:v>
+                </c:pt>
+                <c:pt idx="64">
+                  <c:v>-0.12959999999999927</c:v>
+                </c:pt>
+                <c:pt idx="65">
+                  <c:v>-0.12249999999999929</c:v>
+                </c:pt>
+                <c:pt idx="66">
+                  <c:v>-0.11559999999999934</c:v>
+                </c:pt>
+                <c:pt idx="67">
+                  <c:v>-0.10889999999999934</c:v>
+                </c:pt>
+                <c:pt idx="68">
+                  <c:v>-0.10239999999999937</c:v>
+                </c:pt>
+                <c:pt idx="69">
+                  <c:v>-9.609999999999938E-2</c:v>
+                </c:pt>
+                <c:pt idx="70">
+                  <c:v>-8.99999999999994E-2</c:v>
+                </c:pt>
+                <c:pt idx="71">
+                  <c:v>-8.4099999999999411E-2</c:v>
+                </c:pt>
+                <c:pt idx="72">
+                  <c:v>-7.8399999999999456E-2</c:v>
+                </c:pt>
+                <c:pt idx="73">
+                  <c:v>-7.2899999999999465E-2</c:v>
+                </c:pt>
+                <c:pt idx="74">
+                  <c:v>-6.759999999999948E-2</c:v>
+                </c:pt>
+                <c:pt idx="75">
+                  <c:v>-6.24999999999995E-2</c:v>
+                </c:pt>
+                <c:pt idx="76">
+                  <c:v>-5.7599999999999513E-2</c:v>
+                </c:pt>
+                <c:pt idx="77">
+                  <c:v>-5.2899999999999545E-2</c:v>
+                </c:pt>
+                <c:pt idx="78">
+                  <c:v>-4.8399999999999561E-2</c:v>
+                </c:pt>
+                <c:pt idx="79">
+                  <c:v>-4.4099999999999577E-2</c:v>
+                </c:pt>
+                <c:pt idx="80">
+                  <c:v>0</c:v>
+                </c:pt>
+                <c:pt idx="81">
+                  <c:v>0</c:v>
+                </c:pt>
+                <c:pt idx="82">
+                  <c:v>0</c:v>
+                </c:pt>
+                <c:pt idx="83">
+                  <c:v>0</c:v>
+                </c:pt>
+                <c:pt idx="84">
+                  <c:v>0</c:v>
+                </c:pt>
+                <c:pt idx="85">
+                  <c:v>0</c:v>
+                </c:pt>
+                <c:pt idx="86">
+                  <c:v>0</c:v>
+                </c:pt>
+                <c:pt idx="87">
+                  <c:v>0</c:v>
+                </c:pt>
+                <c:pt idx="88">
+                  <c:v>0</c:v>
+                </c:pt>
+                <c:pt idx="89">
+                  <c:v>0</c:v>
+                </c:pt>
+                <c:pt idx="90">
+                  <c:v>0</c:v>
+                </c:pt>
+                <c:pt idx="91">
+                  <c:v>0</c:v>
+                </c:pt>
+                <c:pt idx="92">
+                  <c:v>0</c:v>
+                </c:pt>
+                <c:pt idx="93">
+                  <c:v>0</c:v>
+                </c:pt>
+                <c:pt idx="94">
+                  <c:v>0</c:v>
+                </c:pt>
+                <c:pt idx="95">
+                  <c:v>0</c:v>
+                </c:pt>
+                <c:pt idx="96">
+                  <c:v>0</c:v>
+                </c:pt>
+                <c:pt idx="97">
+                  <c:v>0</c:v>
+                </c:pt>
+                <c:pt idx="98">
+                  <c:v>0</c:v>
+                </c:pt>
+                <c:pt idx="99">
+                  <c:v>0</c:v>
+                </c:pt>
+                <c:pt idx="100">
+                  <c:v>0</c:v>
+                </c:pt>
+                <c:pt idx="101">
+                  <c:v>0</c:v>
+                </c:pt>
+                <c:pt idx="102">
+                  <c:v>0</c:v>
+                </c:pt>
+                <c:pt idx="103">
+                  <c:v>0</c:v>
+                </c:pt>
+                <c:pt idx="104">
+                  <c:v>0</c:v>
+                </c:pt>
+                <c:pt idx="105">
+                  <c:v>0</c:v>
+                </c:pt>
+                <c:pt idx="106">
+                  <c:v>0</c:v>
+                </c:pt>
+                <c:pt idx="107">
+                  <c:v>0</c:v>
+                </c:pt>
+                <c:pt idx="108">
+                  <c:v>0</c:v>
+                </c:pt>
+                <c:pt idx="109">
+                  <c:v>0</c:v>
+                </c:pt>
+                <c:pt idx="110">
+                  <c:v>0</c:v>
+                </c:pt>
+                <c:pt idx="111">
+                  <c:v>0</c:v>
+                </c:pt>
+                <c:pt idx="112">
+                  <c:v>0</c:v>
+                </c:pt>
+                <c:pt idx="113">
+                  <c:v>0</c:v>
+                </c:pt>
+                <c:pt idx="114">
+                  <c:v>0</c:v>
+                </c:pt>
+                <c:pt idx="115">
+                  <c:v>0</c:v>
+                </c:pt>
+                <c:pt idx="116">
+                  <c:v>0</c:v>
+                </c:pt>
+                <c:pt idx="117">
+                  <c:v>0</c:v>
+                </c:pt>
+                <c:pt idx="118">
+                  <c:v>0</c:v>
+                </c:pt>
+                <c:pt idx="119">
+                  <c:v>0</c:v>
+                </c:pt>
+                <c:pt idx="120">
+                  <c:v>0</c:v>
+                </c:pt>
+                <c:pt idx="121">
+                  <c:v>4.4099999999999993E-2</c:v>
+                </c:pt>
+                <c:pt idx="122">
+                  <c:v>4.8399999999999999E-2</c:v>
+                </c:pt>
+                <c:pt idx="123">
+                  <c:v>5.2900000000000003E-2</c:v>
+                </c:pt>
+                <c:pt idx="124">
+                  <c:v>5.7599999999999998E-2</c:v>
+                </c:pt>
+                <c:pt idx="125">
+                  <c:v>6.25E-2</c:v>
+                </c:pt>
+                <c:pt idx="126">
+                  <c:v>6.7600000000000007E-2</c:v>
+                </c:pt>
+                <c:pt idx="127">
+                  <c:v>7.2900000000000006E-2</c:v>
+                </c:pt>
+                <c:pt idx="128">
+                  <c:v>7.8400000000000011E-2</c:v>
+                </c:pt>
+                <c:pt idx="129">
+                  <c:v>8.4099999999999994E-2</c:v>
+                </c:pt>
+                <c:pt idx="130">
+                  <c:v>0.09</c:v>
+                </c:pt>
+                <c:pt idx="131">
+                  <c:v>9.6100000000000005E-2</c:v>
+                </c:pt>
+                <c:pt idx="132">
+                  <c:v>0.1024</c:v>
+                </c:pt>
+                <c:pt idx="133">
+                  <c:v>0.10890000000000001</c:v>
+                </c:pt>
+                <c:pt idx="134">
+                  <c:v>0.11560000000000002</c:v>
+                </c:pt>
+                <c:pt idx="135">
+                  <c:v>0.12249999999999998</c:v>
+                </c:pt>
+                <c:pt idx="136">
+                  <c:v>0.12959999999999999</c:v>
+                </c:pt>
+                <c:pt idx="137">
+                  <c:v>0.13689999999999999</c:v>
+                </c:pt>
+                <c:pt idx="138">
+                  <c:v>0.1444</c:v>
+                </c:pt>
+                <c:pt idx="139">
+                  <c:v>0.15210000000000001</c:v>
+                </c:pt>
+                <c:pt idx="140">
+                  <c:v>0.16000000000000003</c:v>
+                </c:pt>
+                <c:pt idx="141">
+                  <c:v>0.16809999999999997</c:v>
+                </c:pt>
+                <c:pt idx="142">
+                  <c:v>0.17639999999999997</c:v>
+                </c:pt>
+                <c:pt idx="143">
+                  <c:v>0.18489999999999998</c:v>
+                </c:pt>
+                <c:pt idx="144">
+                  <c:v>0.19359999999999999</c:v>
+                </c:pt>
+                <c:pt idx="145">
+                  <c:v>0.20250000000000001</c:v>
+                </c:pt>
+                <c:pt idx="146">
+                  <c:v>0.21160000000000001</c:v>
+                </c:pt>
+                <c:pt idx="147">
+                  <c:v>0.22089999999999999</c:v>
+                </c:pt>
+                <c:pt idx="148">
+                  <c:v>0.23039999999999999</c:v>
+                </c:pt>
+                <c:pt idx="149">
+                  <c:v>0.24009999999999998</c:v>
+                </c:pt>
+                <c:pt idx="150">
+                  <c:v>0.25</c:v>
+                </c:pt>
+                <c:pt idx="151">
+                  <c:v>0.2601</c:v>
+                </c:pt>
+                <c:pt idx="152">
+                  <c:v>0.27040000000000003</c:v>
+                </c:pt>
+                <c:pt idx="153">
+                  <c:v>0.28090000000000004</c:v>
+                </c:pt>
+                <c:pt idx="154">
+                  <c:v>0.29160000000000003</c:v>
+                </c:pt>
+                <c:pt idx="155">
+                  <c:v>0.30250000000000005</c:v>
+                </c:pt>
+                <c:pt idx="156">
+                  <c:v>0.31360000000000005</c:v>
+                </c:pt>
+                <c:pt idx="157">
+                  <c:v>0.32489999999999997</c:v>
+                </c:pt>
+                <c:pt idx="158">
+                  <c:v>0.33639999999999998</c:v>
+                </c:pt>
+                <c:pt idx="159">
+                  <c:v>0.34809999999999997</c:v>
+                </c:pt>
+                <c:pt idx="160">
+                  <c:v>0.36</c:v>
+                </c:pt>
+                <c:pt idx="161">
+                  <c:v>0.37209999999999999</c:v>
+                </c:pt>
+                <c:pt idx="162">
+                  <c:v>0.38440000000000002</c:v>
+                </c:pt>
+                <c:pt idx="163">
+                  <c:v>0.39690000000000003</c:v>
+                </c:pt>
+                <c:pt idx="164">
+                  <c:v>0.40960000000000002</c:v>
+                </c:pt>
+                <c:pt idx="165">
+                  <c:v>0.42250000000000004</c:v>
+                </c:pt>
+                <c:pt idx="166">
+                  <c:v>0.43560000000000004</c:v>
+                </c:pt>
+                <c:pt idx="167">
+                  <c:v>0.44890000000000008</c:v>
+                </c:pt>
+                <c:pt idx="168">
+                  <c:v>0.46240000000000009</c:v>
+                </c:pt>
+                <c:pt idx="169">
+                  <c:v>0.47609999999999991</c:v>
+                </c:pt>
+                <c:pt idx="170">
+                  <c:v>0.48999999999999994</c:v>
+                </c:pt>
+                <c:pt idx="171">
+                  <c:v>0.50409999999999999</c:v>
+                </c:pt>
+                <c:pt idx="172">
+                  <c:v>0.51839999999999997</c:v>
+                </c:pt>
+                <c:pt idx="173">
+                  <c:v>0.53289999999999993</c:v>
+                </c:pt>
+                <c:pt idx="174">
+                  <c:v>0.54759999999999998</c:v>
+                </c:pt>
+                <c:pt idx="175">
+                  <c:v>0.5625</c:v>
+                </c:pt>
+                <c:pt idx="176">
+                  <c:v>0.5776</c:v>
+                </c:pt>
+                <c:pt idx="177">
+                  <c:v>0.59289999999999998</c:v>
+                </c:pt>
+                <c:pt idx="178">
+                  <c:v>0.60840000000000005</c:v>
+                </c:pt>
+                <c:pt idx="179">
+                  <c:v>0.6241000000000001</c:v>
+                </c:pt>
+                <c:pt idx="180">
+                  <c:v>0.64000000000000012</c:v>
+                </c:pt>
+                <c:pt idx="181">
+                  <c:v>0.65610000000000013</c:v>
+                </c:pt>
+                <c:pt idx="182">
+                  <c:v>0.67239999999999989</c:v>
+                </c:pt>
+                <c:pt idx="183">
+                  <c:v>0.68889999999999996</c:v>
+                </c:pt>
+                <c:pt idx="184">
+                  <c:v>0.70559999999999989</c:v>
+                </c:pt>
+                <c:pt idx="185">
+                  <c:v>0.72249999999999992</c:v>
+                </c:pt>
+                <c:pt idx="186">
+                  <c:v>0.73959999999999992</c:v>
+                </c:pt>
+                <c:pt idx="187">
+                  <c:v>0.75690000000000002</c:v>
+                </c:pt>
+                <c:pt idx="188">
+                  <c:v>0.77439999999999998</c:v>
+                </c:pt>
+                <c:pt idx="189">
+                  <c:v>0.79210000000000003</c:v>
+                </c:pt>
+                <c:pt idx="190">
+                  <c:v>0.81</c:v>
+                </c:pt>
+                <c:pt idx="191">
+                  <c:v>0.82810000000000006</c:v>
+                </c:pt>
+                <c:pt idx="192">
+                  <c:v>0.84640000000000004</c:v>
+                </c:pt>
+                <c:pt idx="193">
+                  <c:v>0.86490000000000011</c:v>
+                </c:pt>
+                <c:pt idx="194">
+                  <c:v>0.88359999999999994</c:v>
+                </c:pt>
+                <c:pt idx="195">
+                  <c:v>0.90249999999999997</c:v>
+                </c:pt>
+                <c:pt idx="196">
+                  <c:v>0.92159999999999997</c:v>
+                </c:pt>
+                <c:pt idx="197">
+                  <c:v>0.94089999999999996</c:v>
+                </c:pt>
+                <c:pt idx="198">
+                  <c:v>0.96039999999999992</c:v>
+                </c:pt>
+                <c:pt idx="199">
+                  <c:v>0.98009999999999997</c:v>
+                </c:pt>
+                <c:pt idx="200">
+                  <c:v>1</c:v>
+                </c:pt>
+              </c:numCache>
+            </c:numRef>
+          </c:yVal>
+          <c:smooth val="0"/>
+          <c:extLst>
+            <c:ext xmlns:c16="http://schemas.microsoft.com/office/drawing/2014/chart" uri="{C3380CC4-5D6E-409C-BE32-E72D297353CC}">
+              <c16:uniqueId val="{00000001-426E-43ED-A050-4BC63809F845}"/>
+            </c:ext>
+          </c:extLst>
+        </c:ser>
+        <c:dLbls>
+          <c:showLegendKey val="0"/>
+          <c:showVal val="0"/>
+          <c:showCatName val="0"/>
+          <c:showSerName val="0"/>
+          <c:showPercent val="0"/>
+          <c:showBubbleSize val="0"/>
+        </c:dLbls>
+        <c:axId val="198549759"/>
+        <c:axId val="198187743"/>
+      </c:scatterChart>
+      <c:valAx>
+        <c:axId val="198549759"/>
+        <c:scaling>
+          <c:orientation val="minMax"/>
+        </c:scaling>
+        <c:delete val="0"/>
+        <c:axPos val="b"/>
+        <c:majorGridlines>
+          <c:spPr>
+            <a:ln w="9525" cap="flat" cmpd="sng" algn="ctr">
+              <a:solidFill>
+                <a:schemeClr val="tx1">
+                  <a:lumMod val="15000"/>
+                  <a:lumOff val="85000"/>
+                </a:schemeClr>
+              </a:solidFill>
+              <a:round/>
+            </a:ln>
+            <a:effectLst/>
+          </c:spPr>
+        </c:majorGridlines>
+        <c:title>
+          <c:tx>
+            <c:rich>
+              <a:bodyPr rot="0" spcFirstLastPara="1" vertOverflow="ellipsis" vert="horz" wrap="square" anchor="ctr" anchorCtr="1"/>
+              <a:lstStyle/>
+              <a:p>
+                <a:pPr>
+                  <a:defRPr sz="1000" b="0" i="0" u="none" strike="noStrike" kern="1200" baseline="0">
+                    <a:solidFill>
+                      <a:schemeClr val="tx1">
+                        <a:lumMod val="65000"/>
+                        <a:lumOff val="35000"/>
+                      </a:schemeClr>
+                    </a:solidFill>
+                    <a:latin typeface="+mn-lt"/>
+                    <a:ea typeface="+mn-ea"/>
+                    <a:cs typeface="+mn-cs"/>
+                  </a:defRPr>
+                </a:pPr>
+                <a:r>
+                  <a:rPr lang="en-US"/>
+                  <a:t>Joystick</a:t>
+                </a:r>
+                <a:r>
+                  <a:rPr lang="en-US" baseline="0"/>
+                  <a:t> Input</a:t>
+                </a:r>
+                <a:endParaRPr lang="en-US"/>
+              </a:p>
+            </c:rich>
+          </c:tx>
+          <c:overlay val="0"/>
+          <c:spPr>
+            <a:noFill/>
+            <a:ln>
+              <a:noFill/>
+            </a:ln>
+            <a:effectLst/>
+          </c:spPr>
+          <c:txPr>
+            <a:bodyPr rot="0" spcFirstLastPara="1" vertOverflow="ellipsis" vert="horz" wrap="square" anchor="ctr" anchorCtr="1"/>
+            <a:lstStyle/>
+            <a:p>
+              <a:pPr>
+                <a:defRPr sz="1000" b="0" i="0" u="none" strike="noStrike" kern="1200" baseline="0">
+                  <a:solidFill>
+                    <a:schemeClr val="tx1">
+                      <a:lumMod val="65000"/>
+                      <a:lumOff val="35000"/>
+                    </a:schemeClr>
+                  </a:solidFill>
+                  <a:latin typeface="+mn-lt"/>
+                  <a:ea typeface="+mn-ea"/>
+                  <a:cs typeface="+mn-cs"/>
+                </a:defRPr>
+              </a:pPr>
+              <a:endParaRPr lang="en-US"/>
+            </a:p>
+          </c:txPr>
+        </c:title>
+        <c:numFmt formatCode="General" sourceLinked="1"/>
+        <c:majorTickMark val="none"/>
+        <c:minorTickMark val="none"/>
+        <c:tickLblPos val="nextTo"/>
+        <c:spPr>
+          <a:noFill/>
+          <a:ln w="9525" cap="flat" cmpd="sng" algn="ctr">
+            <a:solidFill>
+              <a:schemeClr val="tx1">
+                <a:lumMod val="25000"/>
+                <a:lumOff val="75000"/>
+              </a:schemeClr>
+            </a:solidFill>
+            <a:round/>
+          </a:ln>
+          <a:effectLst/>
+        </c:spPr>
+        <c:txPr>
+          <a:bodyPr rot="-60000000" spcFirstLastPara="1" vertOverflow="ellipsis" vert="horz" wrap="square" anchor="ctr" anchorCtr="1"/>
+          <a:lstStyle/>
+          <a:p>
+            <a:pPr>
+              <a:defRPr sz="900" b="0" i="0" u="none" strike="noStrike" kern="1200" baseline="0">
+                <a:solidFill>
+                  <a:schemeClr val="tx1">
+                    <a:lumMod val="65000"/>
+                    <a:lumOff val="35000"/>
+                  </a:schemeClr>
+                </a:solidFill>
+                <a:latin typeface="+mn-lt"/>
+                <a:ea typeface="+mn-ea"/>
+                <a:cs typeface="+mn-cs"/>
+              </a:defRPr>
+            </a:pPr>
+            <a:endParaRPr lang="en-US"/>
+          </a:p>
+        </c:txPr>
+        <c:crossAx val="198187743"/>
+        <c:crosses val="autoZero"/>
+        <c:crossBetween val="midCat"/>
+      </c:valAx>
+      <c:valAx>
+        <c:axId val="198187743"/>
+        <c:scaling>
+          <c:orientation val="minMax"/>
+        </c:scaling>
+        <c:delete val="0"/>
+        <c:axPos val="l"/>
+        <c:majorGridlines>
+          <c:spPr>
+            <a:ln w="9525" cap="flat" cmpd="sng" algn="ctr">
+              <a:solidFill>
+                <a:schemeClr val="tx1">
+                  <a:lumMod val="15000"/>
+                  <a:lumOff val="85000"/>
+                </a:schemeClr>
+              </a:solidFill>
+              <a:round/>
+            </a:ln>
+            <a:effectLst/>
+          </c:spPr>
+        </c:majorGridlines>
+        <c:title>
+          <c:tx>
+            <c:rich>
+              <a:bodyPr rot="-5400000" spcFirstLastPara="1" vertOverflow="ellipsis" vert="horz" wrap="square" anchor="ctr" anchorCtr="1"/>
+              <a:lstStyle/>
+              <a:p>
+                <a:pPr>
+                  <a:defRPr sz="1000" b="0" i="0" u="none" strike="noStrike" kern="1200" baseline="0">
+                    <a:solidFill>
+                      <a:schemeClr val="tx1">
+                        <a:lumMod val="65000"/>
+                        <a:lumOff val="35000"/>
+                      </a:schemeClr>
+                    </a:solidFill>
+                    <a:latin typeface="+mn-lt"/>
+                    <a:ea typeface="+mn-ea"/>
+                    <a:cs typeface="+mn-cs"/>
+                  </a:defRPr>
+                </a:pPr>
+                <a:r>
+                  <a:rPr lang="en-US"/>
+                  <a:t>Power</a:t>
+                </a:r>
+                <a:r>
+                  <a:rPr lang="en-US" baseline="0"/>
+                  <a:t> Output</a:t>
+                </a:r>
+                <a:endParaRPr lang="en-US"/>
+              </a:p>
+            </c:rich>
+          </c:tx>
+          <c:overlay val="0"/>
+          <c:spPr>
+            <a:noFill/>
+            <a:ln>
+              <a:noFill/>
+            </a:ln>
+            <a:effectLst/>
+          </c:spPr>
+          <c:txPr>
+            <a:bodyPr rot="-5400000" spcFirstLastPara="1" vertOverflow="ellipsis" vert="horz" wrap="square" anchor="ctr" anchorCtr="1"/>
+            <a:lstStyle/>
+            <a:p>
+              <a:pPr>
+                <a:defRPr sz="1000" b="0" i="0" u="none" strike="noStrike" kern="1200" baseline="0">
+                  <a:solidFill>
+                    <a:schemeClr val="tx1">
+                      <a:lumMod val="65000"/>
+                      <a:lumOff val="35000"/>
+                    </a:schemeClr>
+                  </a:solidFill>
+                  <a:latin typeface="+mn-lt"/>
+                  <a:ea typeface="+mn-ea"/>
+                  <a:cs typeface="+mn-cs"/>
+                </a:defRPr>
+              </a:pPr>
+              <a:endParaRPr lang="en-US"/>
+            </a:p>
+          </c:txPr>
+        </c:title>
+        <c:numFmt formatCode="General" sourceLinked="1"/>
+        <c:majorTickMark val="none"/>
+        <c:minorTickMark val="none"/>
+        <c:tickLblPos val="nextTo"/>
+        <c:spPr>
+          <a:noFill/>
+          <a:ln w="9525" cap="flat" cmpd="sng" algn="ctr">
+            <a:solidFill>
+              <a:schemeClr val="tx1">
+                <a:lumMod val="25000"/>
+                <a:lumOff val="75000"/>
+              </a:schemeClr>
+            </a:solidFill>
+            <a:round/>
+          </a:ln>
+          <a:effectLst/>
+        </c:spPr>
+        <c:txPr>
+          <a:bodyPr rot="-60000000" spcFirstLastPara="1" vertOverflow="ellipsis" vert="horz" wrap="square" anchor="ctr" anchorCtr="1"/>
+          <a:lstStyle/>
+          <a:p>
+            <a:pPr>
+              <a:defRPr sz="900" b="0" i="0" u="none" strike="noStrike" kern="1200" baseline="0">
+                <a:solidFill>
+                  <a:schemeClr val="tx1">
+                    <a:lumMod val="65000"/>
+                    <a:lumOff val="35000"/>
+                  </a:schemeClr>
+                </a:solidFill>
+                <a:latin typeface="+mn-lt"/>
+                <a:ea typeface="+mn-ea"/>
+                <a:cs typeface="+mn-cs"/>
+              </a:defRPr>
+            </a:pPr>
+            <a:endParaRPr lang="en-US"/>
+          </a:p>
+        </c:txPr>
+        <c:crossAx val="198549759"/>
+        <c:crosses val="autoZero"/>
+        <c:crossBetween val="midCat"/>
+      </c:valAx>
+      <c:spPr>
+        <a:noFill/>
+        <a:ln>
+          <a:noFill/>
+        </a:ln>
+        <a:effectLst/>
+      </c:spPr>
+    </c:plotArea>
+    <c:legend>
+      <c:legendPos val="b"/>
+      <c:overlay val="0"/>
+      <c:spPr>
+        <a:noFill/>
+        <a:ln>
+          <a:noFill/>
+        </a:ln>
+        <a:effectLst/>
+      </c:spPr>
+      <c:txPr>
+        <a:bodyPr rot="0" spcFirstLastPara="1" vertOverflow="ellipsis" vert="horz" wrap="square" anchor="ctr" anchorCtr="1"/>
+        <a:lstStyle/>
+        <a:p>
+          <a:pPr>
+            <a:defRPr sz="900" b="0" i="0" u="none" strike="noStrike" kern="1200" baseline="0">
+              <a:solidFill>
+                <a:schemeClr val="tx1">
+                  <a:lumMod val="65000"/>
+                  <a:lumOff val="35000"/>
+                </a:schemeClr>
+              </a:solidFill>
+              <a:latin typeface="+mn-lt"/>
+              <a:ea typeface="+mn-ea"/>
+              <a:cs typeface="+mn-cs"/>
+            </a:defRPr>
+          </a:pPr>
+          <a:endParaRPr lang="en-US"/>
+        </a:p>
+      </c:txPr>
+    </c:legend>
+    <c:plotVisOnly val="1"/>
+    <c:dispBlanksAs val="gap"/>
+    <c:extLst>
+      <c:ext xmlns:c16r3="http://schemas.microsoft.com/office/drawing/2017/03/chart" uri="{56B9EC1D-385E-4148-901F-78D8002777C0}">
+        <c16r3:dataDisplayOptions16>
+          <c16r3:dispNaAsBlank val="1"/>
+        </c16r3:dataDisplayOptions16>
+      </c:ext>
+    </c:extLst>
+    <c:showDLblsOverMax val="0"/>
+  </c:chart>
+  <c:spPr>
+    <a:noFill/>
+    <a:ln>
+      <a:noFill/>
+    </a:ln>
+    <a:effectLst/>
+  </c:spPr>
+  <c:txPr>
+    <a:bodyPr/>
+    <a:lstStyle/>
+    <a:p>
+      <a:pPr>
+        <a:defRPr/>
+      </a:pPr>
+      <a:endParaRPr lang="en-US"/>
+    </a:p>
+  </c:txPr>
+  <c:externalData r:id="rId3">
+    <c:autoUpdate val="0"/>
+  </c:externalData>
+</c:chartSpace>
+</file>
+
+<file path=ppt/charts/colors1.xml><?xml version="1.0" encoding="utf-8"?>
+<cs:colorStyle xmlns:cs="http://schemas.microsoft.com/office/drawing/2012/chartStyle" xmlns:a="http://schemas.openxmlformats.org/drawingml/2006/main" meth="cycle" id="10">
+  <a:schemeClr val="accent1"/>
+  <a:schemeClr val="accent2"/>
+  <a:schemeClr val="accent3"/>
+  <a:schemeClr val="accent4"/>
+  <a:schemeClr val="accent5"/>
+  <a:schemeClr val="accent6"/>
+  <cs:variation/>
+  <cs:variation>
+    <a:lumMod val="60000"/>
+  </cs:variation>
+  <cs:variation>
+    <a:lumMod val="80000"/>
+    <a:lumOff val="20000"/>
+  </cs:variation>
+  <cs:variation>
+    <a:lumMod val="80000"/>
+  </cs:variation>
+  <cs:variation>
+    <a:lumMod val="60000"/>
+    <a:lumOff val="40000"/>
+  </cs:variation>
+  <cs:variation>
+    <a:lumMod val="50000"/>
+  </cs:variation>
+  <cs:variation>
+    <a:lumMod val="70000"/>
+    <a:lumOff val="30000"/>
+  </cs:variation>
+  <cs:variation>
+    <a:lumMod val="70000"/>
+  </cs:variation>
+  <cs:variation>
+    <a:lumMod val="50000"/>
+    <a:lumOff val="50000"/>
+  </cs:variation>
+</cs:colorStyle>
+</file>
+
+<file path=ppt/charts/style1.xml><?xml version="1.0" encoding="utf-8"?>
+<cs:chartStyle xmlns:cs="http://schemas.microsoft.com/office/drawing/2012/chartStyle" xmlns:a="http://schemas.openxmlformats.org/drawingml/2006/main" id="240">
+  <cs:axisTitle>
+    <cs:lnRef idx="0"/>
+    <cs:fillRef idx="0"/>
+    <cs:effectRef idx="0"/>
+    <cs:fontRef idx="minor">
+      <a:schemeClr val="tx1">
+        <a:lumMod val="65000"/>
+        <a:lumOff val="35000"/>
+      </a:schemeClr>
+    </cs:fontRef>
+    <cs:defRPr sz="1000" kern="1200"/>
+  </cs:axisTitle>
+  <cs:categoryAxis>
+    <cs:lnRef idx="0"/>
+    <cs:fillRef idx="0"/>
+    <cs:effectRef idx="0"/>
+    <cs:fontRef idx="minor">
+      <a:schemeClr val="tx1">
+        <a:lumMod val="65000"/>
+        <a:lumOff val="35000"/>
+      </a:schemeClr>
+    </cs:fontRef>
+    <cs:spPr>
+      <a:ln w="9525" cap="flat" cmpd="sng" algn="ctr">
+        <a:solidFill>
+          <a:schemeClr val="tx1">
+            <a:lumMod val="25000"/>
+            <a:lumOff val="75000"/>
+          </a:schemeClr>
+        </a:solidFill>
+        <a:round/>
+      </a:ln>
+    </cs:spPr>
+    <cs:defRPr sz="900" kern="1200"/>
+  </cs:categoryAxis>
+  <cs:chartArea mods="allowNoFillOverride allowNoLineOverride">
+    <cs:lnRef idx="0"/>
+    <cs:fillRef idx="0"/>
+    <cs:effectRef idx="0"/>
+    <cs:fontRef idx="minor">
+      <a:schemeClr val="tx1"/>
+    </cs:fontRef>
+    <cs:spPr>
+      <a:solidFill>
+        <a:schemeClr val="bg1"/>
+      </a:solidFill>
+      <a:ln w="9525" cap="flat" cmpd="sng" algn="ctr">
+        <a:solidFill>
+          <a:schemeClr val="tx1">
+            <a:lumMod val="15000"/>
+            <a:lumOff val="85000"/>
+          </a:schemeClr>
+        </a:solidFill>
+        <a:round/>
+      </a:ln>
+    </cs:spPr>
+    <cs:defRPr sz="1000" kern="1200"/>
+  </cs:chartArea>
+  <cs:dataLabel>
+    <cs:lnRef idx="0"/>
+    <cs:fillRef idx="0"/>
+    <cs:effectRef idx="0"/>
+    <cs:fontRef idx="minor">
+      <a:schemeClr val="tx1">
+        <a:lumMod val="75000"/>
+        <a:lumOff val="25000"/>
+      </a:schemeClr>
+    </cs:fontRef>
+    <cs:defRPr sz="900" kern="1200"/>
+  </cs:dataLabel>
+  <cs:dataLabelCallout>
+    <cs:lnRef idx="0"/>
+    <cs:fillRef idx="0"/>
+    <cs:effectRef idx="0"/>
+    <cs:fontRef idx="minor">
+      <a:schemeClr val="dk1">
+        <a:lumMod val="65000"/>
+        <a:lumOff val="35000"/>
+      </a:schemeClr>
+    </cs:fontRef>
+    <cs:spPr>
+      <a:solidFill>
+        <a:schemeClr val="lt1"/>
+      </a:solidFill>
+      <a:ln>
+        <a:solidFill>
+          <a:schemeClr val="dk1">
+            <a:lumMod val="25000"/>
+            <a:lumOff val="75000"/>
+          </a:schemeClr>
+        </a:solidFill>
+      </a:ln>
+    </cs:spPr>
+    <cs:defRPr sz="900" kern="1200"/>
+    <cs:bodyPr rot="0" spcFirstLastPara="1" vertOverflow="clip" horzOverflow="clip" vert="horz" wrap="square" lIns="36576" tIns="18288" rIns="36576" bIns="18288" anchor="ctr" anchorCtr="1">
+      <a:spAutoFit/>
+    </cs:bodyPr>
+  </cs:dataLabelCallout>
+  <cs:dataPoint>
+    <cs:lnRef idx="0"/>
+    <cs:fillRef idx="1">
+      <cs:styleClr val="auto"/>
+    </cs:fillRef>
+    <cs:effectRef idx="0"/>
+    <cs:fontRef idx="minor">
+      <a:schemeClr val="tx1"/>
+    </cs:fontRef>
+  </cs:dataPoint>
+  <cs:dataPoint3D>
+    <cs:lnRef idx="0"/>
+    <cs:fillRef idx="1">
+      <cs:styleClr val="auto"/>
+    </cs:fillRef>
+    <cs:effectRef idx="0"/>
+    <cs:fontRef idx="minor">
+      <a:schemeClr val="tx1"/>
+    </cs:fontRef>
+  </cs:dataPoint3D>
+  <cs:dataPointLine>
+    <cs:lnRef idx="0">
+      <cs:styleClr val="auto"/>
+    </cs:lnRef>
+    <cs:fillRef idx="1"/>
+    <cs:effectRef idx="0"/>
+    <cs:fontRef idx="minor">
+      <a:schemeClr val="tx1"/>
+    </cs:fontRef>
+    <cs:spPr>
+      <a:ln w="19050" cap="rnd">
+        <a:solidFill>
+          <a:schemeClr val="phClr"/>
+        </a:solidFill>
+        <a:round/>
+      </a:ln>
+    </cs:spPr>
+  </cs:dataPointLine>
+  <cs:dataPointMarker>
+    <cs:lnRef idx="0">
+      <cs:styleClr val="auto"/>
+    </cs:lnRef>
+    <cs:fillRef idx="1">
+      <cs:styleClr val="auto"/>
+    </cs:fillRef>
+    <cs:effectRef idx="0"/>
+    <cs:fontRef idx="minor">
+      <a:schemeClr val="tx1"/>
+    </cs:fontRef>
+    <cs:spPr>
+      <a:ln w="9525">
+        <a:solidFill>
+          <a:schemeClr val="phClr"/>
+        </a:solidFill>
+      </a:ln>
+    </cs:spPr>
+  </cs:dataPointMarker>
+  <cs:dataPointMarkerLayout symbol="circle" size="5"/>
+  <cs:dataPointWireframe>
+    <cs:lnRef idx="0">
+      <cs:styleClr val="auto"/>
+    </cs:lnRef>
+    <cs:fillRef idx="0"/>
+    <cs:effectRef idx="0"/>
+    <cs:fontRef idx="minor">
+      <a:schemeClr val="dk1"/>
+    </cs:fontRef>
+    <cs:spPr>
+      <a:ln w="9525" cap="rnd">
+        <a:solidFill>
+          <a:schemeClr val="phClr"/>
+        </a:solidFill>
+        <a:round/>
+      </a:ln>
+    </cs:spPr>
+  </cs:dataPointWireframe>
+  <cs:dataTable>
+    <cs:lnRef idx="0"/>
+    <cs:fillRef idx="0"/>
+    <cs:effectRef idx="0"/>
+    <cs:fontRef idx="minor">
+      <a:schemeClr val="tx1">
+        <a:lumMod val="65000"/>
+        <a:lumOff val="35000"/>
+      </a:schemeClr>
+    </cs:fontRef>
+    <cs:spPr>
+      <a:noFill/>
+      <a:ln w="9525" cap="flat" cmpd="sng" algn="ctr">
+        <a:solidFill>
+          <a:schemeClr val="tx1">
+            <a:lumMod val="15000"/>
+            <a:lumOff val="85000"/>
+          </a:schemeClr>
+        </a:solidFill>
+        <a:round/>
+      </a:ln>
+    </cs:spPr>
+    <cs:defRPr sz="900" kern="1200"/>
+  </cs:dataTable>
+  <cs:downBar>
+    <cs:lnRef idx="0"/>
+    <cs:fillRef idx="0"/>
+    <cs:effectRef idx="0"/>
+    <cs:fontRef idx="minor">
+      <a:schemeClr val="tx1"/>
+    </cs:fontRef>
+    <cs:spPr>
+      <a:solidFill>
+        <a:schemeClr val="dk1">
+          <a:lumMod val="75000"/>
+          <a:lumOff val="25000"/>
+        </a:schemeClr>
+      </a:solidFill>
+      <a:ln w="9525" cap="flat" cmpd="sng" algn="ctr">
+        <a:solidFill>
+          <a:schemeClr val="tx1">
+            <a:lumMod val="65000"/>
+            <a:lumOff val="35000"/>
+          </a:schemeClr>
+        </a:solidFill>
+        <a:round/>
+      </a:ln>
+    </cs:spPr>
+  </cs:downBar>
+  <cs:dropLine>
+    <cs:lnRef idx="0"/>
+    <cs:fillRef idx="0"/>
+    <cs:effectRef idx="0"/>
+    <cs:fontRef idx="minor">
+      <a:schemeClr val="tx1"/>
+    </cs:fontRef>
+    <cs:spPr>
+      <a:ln w="9525" cap="flat" cmpd="sng" algn="ctr">
+        <a:solidFill>
+          <a:schemeClr val="tx1">
+            <a:lumMod val="35000"/>
+            <a:lumOff val="65000"/>
+          </a:schemeClr>
+        </a:solidFill>
+        <a:round/>
+      </a:ln>
+    </cs:spPr>
+  </cs:dropLine>
+  <cs:errorBar>
+    <cs:lnRef idx="0"/>
+    <cs:fillRef idx="0"/>
+    <cs:effectRef idx="0"/>
+    <cs:fontRef idx="minor">
+      <a:schemeClr val="tx1"/>
+    </cs:fontRef>
+    <cs:spPr>
+      <a:ln w="9525" cap="flat" cmpd="sng" algn="ctr">
+        <a:solidFill>
+          <a:schemeClr val="tx1">
+            <a:lumMod val="65000"/>
+            <a:lumOff val="35000"/>
+          </a:schemeClr>
+        </a:solidFill>
+        <a:round/>
+      </a:ln>
+    </cs:spPr>
+  </cs:errorBar>
+  <cs:floor>
+    <cs:lnRef idx="0"/>
+    <cs:fillRef idx="0"/>
+    <cs:effectRef idx="0"/>
+    <cs:fontRef idx="minor">
+      <a:schemeClr val="tx1"/>
+    </cs:fontRef>
+    <cs:spPr>
+      <a:noFill/>
+      <a:ln>
+        <a:noFill/>
+      </a:ln>
+    </cs:spPr>
+  </cs:floor>
+  <cs:gridlineMajor>
+    <cs:lnRef idx="0"/>
+    <cs:fillRef idx="0"/>
+    <cs:effectRef idx="0"/>
+    <cs:fontRef idx="minor">
+      <a:schemeClr val="tx1"/>
+    </cs:fontRef>
+    <cs:spPr>
+      <a:ln w="9525" cap="flat" cmpd="sng" algn="ctr">
+        <a:solidFill>
+          <a:schemeClr val="tx1">
+            <a:lumMod val="15000"/>
+            <a:lumOff val="85000"/>
+          </a:schemeClr>
+        </a:solidFill>
+        <a:round/>
+      </a:ln>
+    </cs:spPr>
+  </cs:gridlineMajor>
+  <cs:gridlineMinor>
+    <cs:lnRef idx="0"/>
+    <cs:fillRef idx="0"/>
+    <cs:effectRef idx="0"/>
+    <cs:fontRef idx="minor">
+      <a:schemeClr val="tx1"/>
+    </cs:fontRef>
+    <cs:spPr>
+      <a:ln w="9525" cap="flat" cmpd="sng" algn="ctr">
+        <a:solidFill>
+          <a:schemeClr val="tx1">
+            <a:lumMod val="5000"/>
+            <a:lumOff val="95000"/>
+          </a:schemeClr>
+        </a:solidFill>
+        <a:round/>
+      </a:ln>
+    </cs:spPr>
+  </cs:gridlineMinor>
+  <cs:hiLoLine>
+    <cs:lnRef idx="0"/>
+    <cs:fillRef idx="0"/>
+    <cs:effectRef idx="0"/>
+    <cs:fontRef idx="minor">
+      <a:schemeClr val="tx1"/>
+    </cs:fontRef>
+    <cs:spPr>
+      <a:ln w="9525" cap="flat" cmpd="sng" algn="ctr">
+        <a:solidFill>
+          <a:schemeClr val="tx1">
+            <a:lumMod val="50000"/>
+            <a:lumOff val="50000"/>
+          </a:schemeClr>
+        </a:solidFill>
+        <a:round/>
+      </a:ln>
+    </cs:spPr>
+  </cs:hiLoLine>
+  <cs:leaderLine>
+    <cs:lnRef idx="0"/>
+    <cs:fillRef idx="0"/>
+    <cs:effectRef idx="0"/>
+    <cs:fontRef idx="minor">
+      <a:schemeClr val="tx1"/>
+    </cs:fontRef>
+    <cs:spPr>
+      <a:ln w="9525" cap="flat" cmpd="sng" algn="ctr">
+        <a:solidFill>
+          <a:schemeClr val="tx1">
+            <a:lumMod val="35000"/>
+            <a:lumOff val="65000"/>
+          </a:schemeClr>
+        </a:solidFill>
+        <a:round/>
+      </a:ln>
+    </cs:spPr>
+  </cs:leaderLine>
+  <cs:legend>
+    <cs:lnRef idx="0"/>
+    <cs:fillRef idx="0"/>
+    <cs:effectRef idx="0"/>
+    <cs:fontRef idx="minor">
+      <a:schemeClr val="tx1">
+        <a:lumMod val="65000"/>
+        <a:lumOff val="35000"/>
+      </a:schemeClr>
+    </cs:fontRef>
+    <cs:defRPr sz="900" kern="1200"/>
+  </cs:legend>
+  <cs:plotArea mods="allowNoFillOverride allowNoLineOverride">
+    <cs:lnRef idx="0"/>
+    <cs:fillRef idx="0"/>
+    <cs:effectRef idx="0"/>
+    <cs:fontRef idx="minor">
+      <a:schemeClr val="tx1"/>
+    </cs:fontRef>
+  </cs:plotArea>
+  <cs:plotArea3D mods="allowNoFillOverride allowNoLineOverride">
+    <cs:lnRef idx="0"/>
+    <cs:fillRef idx="0"/>
+    <cs:effectRef idx="0"/>
+    <cs:fontRef idx="minor">
+      <a:schemeClr val="tx1"/>
+    </cs:fontRef>
+  </cs:plotArea3D>
+  <cs:seriesAxis>
+    <cs:lnRef idx="0"/>
+    <cs:fillRef idx="0"/>
+    <cs:effectRef idx="0"/>
+    <cs:fontRef idx="minor">
+      <a:schemeClr val="tx1">
+        <a:lumMod val="65000"/>
+        <a:lumOff val="35000"/>
+      </a:schemeClr>
+    </cs:fontRef>
+    <cs:defRPr sz="900" kern="1200"/>
+  </cs:seriesAxis>
+  <cs:seriesLine>
+    <cs:lnRef idx="0"/>
+    <cs:fillRef idx="0"/>
+    <cs:effectRef idx="0"/>
+    <cs:fontRef idx="minor">
+      <a:schemeClr val="tx1"/>
+    </cs:fontRef>
+    <cs:spPr>
+      <a:ln w="9525" cap="flat" cmpd="sng" algn="ctr">
+        <a:solidFill>
+          <a:schemeClr val="tx1">
+            <a:lumMod val="35000"/>
+            <a:lumOff val="65000"/>
+          </a:schemeClr>
+        </a:solidFill>
+        <a:round/>
+      </a:ln>
+    </cs:spPr>
+  </cs:seriesLine>
+  <cs:title>
+    <cs:lnRef idx="0"/>
+    <cs:fillRef idx="0"/>
+    <cs:effectRef idx="0"/>
+    <cs:fontRef idx="minor">
+      <a:schemeClr val="tx1">
+        <a:lumMod val="65000"/>
+        <a:lumOff val="35000"/>
+      </a:schemeClr>
+    </cs:fontRef>
+    <cs:defRPr sz="1400" b="0" kern="1200" spc="0" baseline="0"/>
+  </cs:title>
+  <cs:trendline>
+    <cs:lnRef idx="0">
+      <cs:styleClr val="auto"/>
+    </cs:lnRef>
+    <cs:fillRef idx="0"/>
+    <cs:effectRef idx="0"/>
+    <cs:fontRef idx="minor">
+      <a:schemeClr val="tx1"/>
+    </cs:fontRef>
+    <cs:spPr>
+      <a:ln w="19050" cap="rnd">
+        <a:solidFill>
+          <a:schemeClr val="phClr"/>
+        </a:solidFill>
+        <a:prstDash val="sysDot"/>
+      </a:ln>
+    </cs:spPr>
+  </cs:trendline>
+  <cs:trendlineLabel>
+    <cs:lnRef idx="0"/>
+    <cs:fillRef idx="0"/>
+    <cs:effectRef idx="0"/>
+    <cs:fontRef idx="minor">
+      <a:schemeClr val="tx1">
+        <a:lumMod val="65000"/>
+        <a:lumOff val="35000"/>
+      </a:schemeClr>
+    </cs:fontRef>
+    <cs:defRPr sz="900" kern="1200"/>
+  </cs:trendlineLabel>
+  <cs:upBar>
+    <cs:lnRef idx="0"/>
+    <cs:fillRef idx="0"/>
+    <cs:effectRef idx="0"/>
+    <cs:fontRef idx="minor">
+      <a:schemeClr val="tx1"/>
+    </cs:fontRef>
+    <cs:spPr>
+      <a:solidFill>
+        <a:schemeClr val="lt1"/>
+      </a:solidFill>
+      <a:ln w="9525" cap="flat" cmpd="sng" algn="ctr">
+        <a:solidFill>
+          <a:schemeClr val="tx1">
+            <a:lumMod val="65000"/>
+            <a:lumOff val="35000"/>
+          </a:schemeClr>
+        </a:solidFill>
+        <a:round/>
+      </a:ln>
+    </cs:spPr>
+  </cs:upBar>
+  <cs:valueAxis>
+    <cs:lnRef idx="0"/>
+    <cs:fillRef idx="0"/>
+    <cs:effectRef idx="0"/>
+    <cs:fontRef idx="minor">
+      <a:schemeClr val="tx1">
+        <a:lumMod val="65000"/>
+        <a:lumOff val="35000"/>
+      </a:schemeClr>
+    </cs:fontRef>
+    <cs:spPr>
+      <a:ln w="9525" cap="flat" cmpd="sng" algn="ctr">
+        <a:solidFill>
+          <a:schemeClr val="tx1">
+            <a:lumMod val="25000"/>
+            <a:lumOff val="75000"/>
+          </a:schemeClr>
+        </a:solidFill>
+        <a:round/>
+      </a:ln>
+    </cs:spPr>
+    <cs:defRPr sz="900" kern="1200"/>
+  </cs:valueAxis>
+  <cs:wall>
+    <cs:lnRef idx="0"/>
+    <cs:fillRef idx="0"/>
+    <cs:effectRef idx="0"/>
+    <cs:fontRef idx="minor">
+      <a:schemeClr val="tx1"/>
+    </cs:fontRef>
+    <cs:spPr>
+      <a:noFill/>
+      <a:ln>
+        <a:noFill/>
+      </a:ln>
+    </cs:spPr>
+  </cs:wall>
+</cs:chartStyle>
+</file>
+
 <file path=ppt/notesMasters/notesMaster1.xml><?xml version="1.0" encoding="utf-8"?>
 <p:notesMaster xmlns:a="http://schemas.openxmlformats.org/drawingml/2006/main" xmlns:r="http://schemas.openxmlformats.org/officeDocument/2006/relationships" xmlns:p="http://schemas.openxmlformats.org/presentationml/2006/main">
   <p:cSld>
@@ -203,7 +3676,7 @@
           <a:p>
             <a:fld id="{88DFE0DC-517A-40C1-B3B1-8C641051689B}" type="datetimeFigureOut">
               <a:rPr lang="en-US" smtClean="0"/>
-              <a:t>11/19/2020</a:t>
+              <a:t>11/23/2020</a:t>
             </a:fld>
             <a:endParaRPr lang="en-US"/>
           </a:p>
@@ -890,7 +4363,7 @@
             <a:fld id="{5923F103-BC34-4FE4-A40E-EDDEECFDA5D0}" type="datetimeFigureOut">
               <a:rPr lang="en-US" dirty="0"/>
               <a:pPr/>
-              <a:t>11/19/2020</a:t>
+              <a:t>11/23/2020</a:t>
             </a:fld>
             <a:endParaRPr lang="en-US" dirty="0"/>
           </a:p>
@@ -1974,7 +5447,7 @@
           <a:p>
             <a:fld id="{923A1CC3-2375-41D4-9E03-427CAF2A4C1A}" type="datetimeFigureOut">
               <a:rPr lang="en-US" dirty="0"/>
-              <a:t>11/19/2020</a:t>
+              <a:t>11/23/2020</a:t>
             </a:fld>
             <a:endParaRPr lang="en-US" dirty="0"/>
           </a:p>
@@ -2950,7 +6423,7 @@
           <a:p>
             <a:fld id="{AFF16868-8199-4C2C-A5B1-63AEE139F88E}" type="datetimeFigureOut">
               <a:rPr lang="en-US" dirty="0"/>
-              <a:t>11/19/2020</a:t>
+              <a:t>11/23/2020</a:t>
             </a:fld>
             <a:endParaRPr lang="en-US" dirty="0"/>
           </a:p>
@@ -4080,7 +7553,7 @@
           <a:p>
             <a:fld id="{AAD9FF7F-6988-44CC-821B-644E70CD2F73}" type="datetimeFigureOut">
               <a:rPr lang="en-US" dirty="0"/>
-              <a:t>11/19/2020</a:t>
+              <a:t>11/23/2020</a:t>
             </a:fld>
             <a:endParaRPr lang="en-US" dirty="0"/>
           </a:p>
@@ -5109,7 +8582,7 @@
           <a:p>
             <a:fld id="{5C12C299-16B2-4475-990D-751901EACC14}" type="datetimeFigureOut">
               <a:rPr lang="en-US" dirty="0"/>
-              <a:t>11/19/2020</a:t>
+              <a:t>11/23/2020</a:t>
             </a:fld>
             <a:endParaRPr lang="en-US" dirty="0"/>
           </a:p>
@@ -5765,7 +9238,7 @@
           <a:p>
             <a:fld id="{9FE86839-B9D8-4651-8783-F325ECE74E65}" type="datetimeFigureOut">
               <a:rPr lang="en-US" dirty="0"/>
-              <a:t>11/19/2020</a:t>
+              <a:t>11/23/2020</a:t>
             </a:fld>
             <a:endParaRPr lang="en-US" dirty="0"/>
           </a:p>
@@ -6622,7 +10095,7 @@
           <a:p>
             <a:fld id="{FD484F64-32F6-45C5-931F-ADC1662401D0}" type="datetimeFigureOut">
               <a:rPr lang="en-US" dirty="0"/>
-              <a:t>11/19/2020</a:t>
+              <a:t>11/23/2020</a:t>
             </a:fld>
             <a:endParaRPr lang="en-US" dirty="0"/>
           </a:p>
@@ -6808,7 +10281,7 @@
           <a:p>
             <a:fld id="{53086D93-FCAC-47E0-A2EE-787E62CA814C}" type="datetimeFigureOut">
               <a:rPr lang="en-US" dirty="0"/>
-              <a:t>11/19/2020</a:t>
+              <a:t>11/23/2020</a:t>
             </a:fld>
             <a:endParaRPr lang="en-US" dirty="0"/>
           </a:p>
@@ -7776,7 +11249,7 @@
           <a:p>
             <a:fld id="{CDA879A6-0FD0-4734-A311-86BFCA472E6E}" type="datetimeFigureOut">
               <a:rPr lang="en-US" dirty="0"/>
-              <a:t>11/19/2020</a:t>
+              <a:t>11/23/2020</a:t>
             </a:fld>
             <a:endParaRPr lang="en-US" dirty="0"/>
           </a:p>
@@ -7983,7 +11456,7 @@
           <a:p>
             <a:fld id="{19C9CA7B-DFD4-44B5-8C60-D14B8CD1FB59}" type="datetimeFigureOut">
               <a:rPr lang="en-US" dirty="0"/>
-              <a:t>11/19/2020</a:t>
+              <a:t>11/23/2020</a:t>
             </a:fld>
             <a:endParaRPr lang="en-US" dirty="0"/>
           </a:p>
@@ -9013,7 +12486,7 @@
           <a:p>
             <a:fld id="{F34E6425-0181-43F2-84FC-787E803FD2F8}" type="datetimeFigureOut">
               <a:rPr lang="en-US" dirty="0"/>
-              <a:t>11/19/2020</a:t>
+              <a:t>11/23/2020</a:t>
             </a:fld>
             <a:endParaRPr lang="en-US" dirty="0"/>
           </a:p>
@@ -9281,7 +12754,7 @@
           <a:p>
             <a:fld id="{3BDB8791-F1B0-41E7-B7FD-A781E65C4266}" type="datetimeFigureOut">
               <a:rPr lang="en-US" dirty="0"/>
-              <a:t>11/19/2020</a:t>
+              <a:t>11/23/2020</a:t>
             </a:fld>
             <a:endParaRPr lang="en-US" dirty="0"/>
           </a:p>
@@ -9687,7 +13160,7 @@
           <a:p>
             <a:fld id="{5FDD63B2-E120-4ED8-B27B-C685F510A5FE}" type="datetimeFigureOut">
               <a:rPr lang="en-US" dirty="0"/>
-              <a:t>11/19/2020</a:t>
+              <a:t>11/23/2020</a:t>
             </a:fld>
             <a:endParaRPr lang="en-US" dirty="0"/>
           </a:p>
@@ -9810,7 +13283,7 @@
           <a:p>
             <a:fld id="{7AA18ACC-A947-437B-A130-35BD54FDF1E9}" type="datetimeFigureOut">
               <a:rPr lang="en-US" dirty="0"/>
-              <a:t>11/19/2020</a:t>
+              <a:t>11/23/2020</a:t>
             </a:fld>
             <a:endParaRPr lang="en-US" dirty="0"/>
           </a:p>
@@ -9901,7 +13374,7 @@
           <a:p>
             <a:fld id="{7C8D7E02-BCB8-4D50-A234-369438C08659}" type="datetimeFigureOut">
               <a:rPr lang="en-US" dirty="0"/>
-              <a:t>11/19/2020</a:t>
+              <a:t>11/23/2020</a:t>
             </a:fld>
             <a:endParaRPr lang="en-US" dirty="0"/>
           </a:p>
@@ -10978,7 +14451,7 @@
           <a:p>
             <a:fld id="{76E86A4C-8E40-4F87-A4F0-01A0687C5742}" type="datetimeFigureOut">
               <a:rPr lang="en-US" dirty="0"/>
-              <a:t>11/19/2020</a:t>
+              <a:t>11/23/2020</a:t>
             </a:fld>
             <a:endParaRPr lang="en-US" dirty="0"/>
           </a:p>
@@ -12082,7 +15555,7 @@
           <a:p>
             <a:fld id="{35E72C73-2D91-4E12-BA25-F0AA0C03599B}" type="datetimeFigureOut">
               <a:rPr lang="en-US" dirty="0"/>
-              <a:t>11/19/2020</a:t>
+              <a:t>11/23/2020</a:t>
             </a:fld>
             <a:endParaRPr lang="en-US" dirty="0"/>
           </a:p>
@@ -13075,7 +16548,7 @@
           <a:p>
             <a:fld id="{2BE451C3-0FF4-47C4-B829-773ADF60F88C}" type="datetimeFigureOut">
               <a:rPr lang="en-US" dirty="0"/>
-              <a:t>11/19/2020</a:t>
+              <a:t>11/23/2020</a:t>
             </a:fld>
             <a:endParaRPr lang="en-US" dirty="0"/>
           </a:p>
@@ -13827,7 +17300,7 @@
             <a:pPr lvl="1"/>
             <a:r>
               <a:rPr lang="en-US" dirty="0"/>
-              <a:t>Control a motor using analog joystick</a:t>
+              <a:t>Control a Motor With Analog Joystick</a:t>
             </a:r>
           </a:p>
           <a:p>
@@ -13928,12 +17401,23 @@
             <p:ph idx="1"/>
           </p:nvPr>
         </p:nvSpPr>
-        <p:spPr/>
+        <p:spPr>
+          <a:xfrm>
+            <a:off x="1154953" y="2295331"/>
+            <a:ext cx="10442997" cy="4450702"/>
+          </a:xfrm>
+        </p:spPr>
         <p:txBody>
           <a:bodyPr>
-            <a:normAutofit fontScale="77500" lnSpcReduction="20000"/>
+            <a:normAutofit fontScale="92500" lnSpcReduction="20000"/>
           </a:bodyPr>
           <a:lstStyle/>
+          <a:p>
+            <a:r>
+              <a:rPr lang="en-US" dirty="0"/>
+              <a:t>Two types of motor controllers: simple motor controllers, smart motor controllers (PWM vs. communication protocol).</a:t>
+            </a:r>
+          </a:p>
           <a:p>
             <a:r>
               <a:rPr lang="en-US" dirty="0"/>
@@ -14025,6 +17509,36 @@
           </a:p>
         </p:txBody>
       </p:sp>
+      <p:pic>
+        <p:nvPicPr>
+          <p:cNvPr id="5" name="Picture 4">
+            <a:extLst>
+              <a:ext uri="{FF2B5EF4-FFF2-40B4-BE49-F238E27FC236}">
+                <a16:creationId xmlns:a16="http://schemas.microsoft.com/office/drawing/2014/main" id="{AE4BE91A-39E2-456A-BC4B-B9A8D9F2FFCE}"/>
+              </a:ext>
+            </a:extLst>
+          </p:cNvPr>
+          <p:cNvPicPr>
+            <a:picLocks noChangeAspect="1"/>
+          </p:cNvPicPr>
+          <p:nvPr/>
+        </p:nvPicPr>
+        <p:blipFill>
+          <a:blip r:embed="rId2"/>
+          <a:stretch>
+            <a:fillRect/>
+          </a:stretch>
+        </p:blipFill>
+        <p:spPr>
+          <a:xfrm>
+            <a:off x="7719526" y="3657601"/>
+            <a:ext cx="4237469" cy="2929812"/>
+          </a:xfrm>
+          <a:prstGeom prst="rect">
+            <a:avLst/>
+          </a:prstGeom>
+        </p:spPr>
+      </p:pic>
     </p:spTree>
     <p:extLst>
       <p:ext uri="{BB962C8B-B14F-4D97-AF65-F5344CB8AC3E}">
@@ -14289,10 +17803,21 @@
             <p:ph idx="1"/>
           </p:nvPr>
         </p:nvSpPr>
-        <p:spPr/>
+        <p:spPr>
+          <a:xfrm>
+            <a:off x="1154955" y="2603500"/>
+            <a:ext cx="5807908" cy="3416300"/>
+          </a:xfrm>
+        </p:spPr>
         <p:txBody>
           <a:bodyPr/>
           <a:lstStyle/>
+          <a:p>
+            <a:r>
+              <a:rPr lang="en-US" dirty="0"/>
+              <a:t>Understanding analog joystick input to power output curve.</a:t>
+            </a:r>
+          </a:p>
           <a:p>
             <a:r>
               <a:rPr lang="en-US" dirty="0"/>
@@ -14328,6 +17853,36 @@
           </a:p>
         </p:txBody>
       </p:sp>
+      <p:graphicFrame>
+        <p:nvGraphicFramePr>
+          <p:cNvPr id="6" name="Chart 5">
+            <a:extLst>
+              <a:ext uri="{FF2B5EF4-FFF2-40B4-BE49-F238E27FC236}">
+                <a16:creationId xmlns:a16="http://schemas.microsoft.com/office/drawing/2014/main" id="{D637795F-DBAE-4442-B646-A9DC1F95BAB8}"/>
+              </a:ext>
+            </a:extLst>
+          </p:cNvPr>
+          <p:cNvGraphicFramePr>
+            <a:graphicFrameLocks/>
+          </p:cNvGraphicFramePr>
+          <p:nvPr>
+            <p:extLst>
+              <p:ext uri="{D42A27DB-BD31-4B8C-83A1-F6EECF244321}">
+                <p14:modId xmlns:p14="http://schemas.microsoft.com/office/powerpoint/2010/main" val="1609543826"/>
+              </p:ext>
+            </p:extLst>
+          </p:nvPr>
+        </p:nvGraphicFramePr>
+        <p:xfrm>
+          <a:off x="6683829" y="2262674"/>
+          <a:ext cx="5315338" cy="4315408"/>
+        </p:xfrm>
+        <a:graphic>
+          <a:graphicData uri="http://schemas.openxmlformats.org/drawingml/2006/chart">
+            <c:chart xmlns:c="http://schemas.openxmlformats.org/drawingml/2006/chart" xmlns:r="http://schemas.openxmlformats.org/officeDocument/2006/relationships" r:id="rId2"/>
+          </a:graphicData>
+        </a:graphic>
+      </p:graphicFrame>
     </p:spTree>
     <p:extLst>
       <p:ext uri="{BB962C8B-B14F-4D97-AF65-F5344CB8AC3E}">

</xml_diff>